<commit_message>
update doc/Spotlight.pptx with new spotlight (much faster)
</commit_message>
<xml_diff>
--- a/doc/test/Spotlight.pptx
+++ b/doc/test/Spotlight.pptx
@@ -11,12 +11,12 @@
     <p:sldId id="256" r:id="rId5"/>
     <p:sldId id="292" r:id="rId6"/>
     <p:sldId id="257" r:id="rId7"/>
-    <p:sldId id="295" r:id="rId8"/>
-    <p:sldId id="296" r:id="rId9"/>
+    <p:sldId id="301" r:id="rId8"/>
+    <p:sldId id="302" r:id="rId9"/>
     <p:sldId id="293" r:id="rId10"/>
     <p:sldId id="294" r:id="rId11"/>
-    <p:sldId id="297" r:id="rId12"/>
-    <p:sldId id="300" r:id="rId13"/>
+    <p:sldId id="303" r:id="rId12"/>
+    <p:sldId id="304" r:id="rId13"/>
     <p:sldId id="274" r:id="rId14"/>
   </p:sldIdLst>
   <p:sldSz cx="9144000" cy="6858000" type="screen4x3"/>
@@ -129,12 +129,12 @@
             <p14:sldId id="256"/>
             <p14:sldId id="292"/>
             <p14:sldId id="257"/>
-            <p14:sldId id="295"/>
-            <p14:sldId id="296"/>
+            <p14:sldId id="301"/>
+            <p14:sldId id="302"/>
             <p14:sldId id="293"/>
             <p14:sldId id="294"/>
-            <p14:sldId id="297"/>
-            <p14:sldId id="300"/>
+            <p14:sldId id="303"/>
+            <p14:sldId id="304"/>
             <p14:sldId id="274"/>
           </p14:sldIdLst>
         </p14:section>
@@ -339,7 +339,7 @@
           <a:p>
             <a:fld id="{699DC775-C286-4358-8C92-D7E584E969B3}" type="datetimeFigureOut">
               <a:rPr lang="en-US" smtClean="0"/>
-              <a:t>3/26/2014</a:t>
+              <a:t>5/25/2014</a:t>
             </a:fld>
             <a:endParaRPr lang="en-US"/>
           </a:p>
@@ -509,7 +509,7 @@
           <a:p>
             <a:fld id="{699DC775-C286-4358-8C92-D7E584E969B3}" type="datetimeFigureOut">
               <a:rPr lang="en-US" smtClean="0"/>
-              <a:t>3/26/2014</a:t>
+              <a:t>5/25/2014</a:t>
             </a:fld>
             <a:endParaRPr lang="en-US"/>
           </a:p>
@@ -689,7 +689,7 @@
           <a:p>
             <a:fld id="{699DC775-C286-4358-8C92-D7E584E969B3}" type="datetimeFigureOut">
               <a:rPr lang="en-US" smtClean="0"/>
-              <a:t>3/26/2014</a:t>
+              <a:t>5/25/2014</a:t>
             </a:fld>
             <a:endParaRPr lang="en-US"/>
           </a:p>
@@ -931,7 +931,7 @@
           <a:p>
             <a:fld id="{699DC775-C286-4358-8C92-D7E584E969B3}" type="datetimeFigureOut">
               <a:rPr lang="en-US" smtClean="0"/>
-              <a:t>3/26/2014</a:t>
+              <a:t>5/25/2014</a:t>
             </a:fld>
             <a:endParaRPr lang="en-US"/>
           </a:p>
@@ -1101,7 +1101,7 @@
           <a:p>
             <a:fld id="{699DC775-C286-4358-8C92-D7E584E969B3}" type="datetimeFigureOut">
               <a:rPr lang="en-US" smtClean="0"/>
-              <a:t>3/26/2014</a:t>
+              <a:t>5/25/2014</a:t>
             </a:fld>
             <a:endParaRPr lang="en-US"/>
           </a:p>
@@ -1347,7 +1347,7 @@
           <a:p>
             <a:fld id="{699DC775-C286-4358-8C92-D7E584E969B3}" type="datetimeFigureOut">
               <a:rPr lang="en-US" smtClean="0"/>
-              <a:t>3/26/2014</a:t>
+              <a:t>5/25/2014</a:t>
             </a:fld>
             <a:endParaRPr lang="en-US"/>
           </a:p>
@@ -1635,7 +1635,7 @@
           <a:p>
             <a:fld id="{699DC775-C286-4358-8C92-D7E584E969B3}" type="datetimeFigureOut">
               <a:rPr lang="en-US" smtClean="0"/>
-              <a:t>3/26/2014</a:t>
+              <a:t>5/25/2014</a:t>
             </a:fld>
             <a:endParaRPr lang="en-US"/>
           </a:p>
@@ -2057,7 +2057,7 @@
           <a:p>
             <a:fld id="{699DC775-C286-4358-8C92-D7E584E969B3}" type="datetimeFigureOut">
               <a:rPr lang="en-US" smtClean="0"/>
-              <a:t>3/26/2014</a:t>
+              <a:t>5/25/2014</a:t>
             </a:fld>
             <a:endParaRPr lang="en-US"/>
           </a:p>
@@ -2175,7 +2175,7 @@
           <a:p>
             <a:fld id="{699DC775-C286-4358-8C92-D7E584E969B3}" type="datetimeFigureOut">
               <a:rPr lang="en-US" smtClean="0"/>
-              <a:t>3/26/2014</a:t>
+              <a:t>5/25/2014</a:t>
             </a:fld>
             <a:endParaRPr lang="en-US"/>
           </a:p>
@@ -2270,7 +2270,7 @@
           <a:p>
             <a:fld id="{699DC775-C286-4358-8C92-D7E584E969B3}" type="datetimeFigureOut">
               <a:rPr lang="en-US" smtClean="0"/>
-              <a:t>3/26/2014</a:t>
+              <a:t>5/25/2014</a:t>
             </a:fld>
             <a:endParaRPr lang="en-US"/>
           </a:p>
@@ -2547,7 +2547,7 @@
           <a:p>
             <a:fld id="{699DC775-C286-4358-8C92-D7E584E969B3}" type="datetimeFigureOut">
               <a:rPr lang="en-US" smtClean="0"/>
-              <a:t>3/26/2014</a:t>
+              <a:t>5/25/2014</a:t>
             </a:fld>
             <a:endParaRPr lang="en-US"/>
           </a:p>
@@ -2717,7 +2717,7 @@
           <a:p>
             <a:fld id="{699DC775-C286-4358-8C92-D7E584E969B3}" type="datetimeFigureOut">
               <a:rPr lang="en-US" smtClean="0"/>
-              <a:t>3/26/2014</a:t>
+              <a:t>5/25/2014</a:t>
             </a:fld>
             <a:endParaRPr lang="en-US"/>
           </a:p>
@@ -2970,7 +2970,7 @@
           <a:p>
             <a:fld id="{699DC775-C286-4358-8C92-D7E584E969B3}" type="datetimeFigureOut">
               <a:rPr lang="en-US" smtClean="0"/>
-              <a:t>3/26/2014</a:t>
+              <a:t>5/25/2014</a:t>
             </a:fld>
             <a:endParaRPr lang="en-US"/>
           </a:p>
@@ -3140,7 +3140,7 @@
           <a:p>
             <a:fld id="{699DC775-C286-4358-8C92-D7E584E969B3}" type="datetimeFigureOut">
               <a:rPr lang="en-US" smtClean="0"/>
-              <a:t>3/26/2014</a:t>
+              <a:t>5/25/2014</a:t>
             </a:fld>
             <a:endParaRPr lang="en-US"/>
           </a:p>
@@ -3320,7 +3320,7 @@
           <a:p>
             <a:fld id="{699DC775-C286-4358-8C92-D7E584E969B3}" type="datetimeFigureOut">
               <a:rPr lang="en-US" smtClean="0"/>
-              <a:t>3/26/2014</a:t>
+              <a:t>5/25/2014</a:t>
             </a:fld>
             <a:endParaRPr lang="en-US"/>
           </a:p>
@@ -3570,7 +3570,7 @@
           <a:p>
             <a:fld id="{699DC775-C286-4358-8C92-D7E584E969B3}" type="datetimeFigureOut">
               <a:rPr lang="en-US" smtClean="0"/>
-              <a:t>3/26/2014</a:t>
+              <a:t>5/25/2014</a:t>
             </a:fld>
             <a:endParaRPr lang="en-US"/>
           </a:p>
@@ -3748,7 +3748,7 @@
           <a:p>
             <a:fld id="{699DC775-C286-4358-8C92-D7E584E969B3}" type="datetimeFigureOut">
               <a:rPr lang="en-US" smtClean="0"/>
-              <a:t>3/26/2014</a:t>
+              <a:t>5/25/2014</a:t>
             </a:fld>
             <a:endParaRPr lang="en-US"/>
           </a:p>
@@ -4002,7 +4002,7 @@
           <a:p>
             <a:fld id="{699DC775-C286-4358-8C92-D7E584E969B3}" type="datetimeFigureOut">
               <a:rPr lang="en-US" smtClean="0"/>
-              <a:t>3/26/2014</a:t>
+              <a:t>5/25/2014</a:t>
             </a:fld>
             <a:endParaRPr lang="en-US"/>
           </a:p>
@@ -4298,7 +4298,7 @@
           <a:p>
             <a:fld id="{699DC775-C286-4358-8C92-D7E584E969B3}" type="datetimeFigureOut">
               <a:rPr lang="en-US" smtClean="0"/>
-              <a:t>3/26/2014</a:t>
+              <a:t>5/25/2014</a:t>
             </a:fld>
             <a:endParaRPr lang="en-US"/>
           </a:p>
@@ -4728,7 +4728,7 @@
           <a:p>
             <a:fld id="{699DC775-C286-4358-8C92-D7E584E969B3}" type="datetimeFigureOut">
               <a:rPr lang="en-US" smtClean="0"/>
-              <a:t>3/26/2014</a:t>
+              <a:t>5/25/2014</a:t>
             </a:fld>
             <a:endParaRPr lang="en-US"/>
           </a:p>
@@ -4854,7 +4854,7 @@
           <a:p>
             <a:fld id="{699DC775-C286-4358-8C92-D7E584E969B3}" type="datetimeFigureOut">
               <a:rPr lang="en-US" smtClean="0"/>
-              <a:t>3/26/2014</a:t>
+              <a:t>5/25/2014</a:t>
             </a:fld>
             <a:endParaRPr lang="en-US"/>
           </a:p>
@@ -4957,7 +4957,7 @@
           <a:p>
             <a:fld id="{699DC775-C286-4358-8C92-D7E584E969B3}" type="datetimeFigureOut">
               <a:rPr lang="en-US" smtClean="0"/>
-              <a:t>3/26/2014</a:t>
+              <a:t>5/25/2014</a:t>
             </a:fld>
             <a:endParaRPr lang="en-US"/>
           </a:p>
@@ -5203,7 +5203,7 @@
           <a:p>
             <a:fld id="{699DC775-C286-4358-8C92-D7E584E969B3}" type="datetimeFigureOut">
               <a:rPr lang="en-US" smtClean="0"/>
-              <a:t>3/26/2014</a:t>
+              <a:t>5/25/2014</a:t>
             </a:fld>
             <a:endParaRPr lang="en-US"/>
           </a:p>
@@ -5488,7 +5488,7 @@
           <a:p>
             <a:fld id="{699DC775-C286-4358-8C92-D7E584E969B3}" type="datetimeFigureOut">
               <a:rPr lang="en-US" smtClean="0"/>
-              <a:t>3/26/2014</a:t>
+              <a:t>5/25/2014</a:t>
             </a:fld>
             <a:endParaRPr lang="en-US"/>
           </a:p>
@@ -5749,7 +5749,7 @@
           <a:p>
             <a:fld id="{699DC775-C286-4358-8C92-D7E584E969B3}" type="datetimeFigureOut">
               <a:rPr lang="en-US" smtClean="0"/>
-              <a:t>3/26/2014</a:t>
+              <a:t>5/25/2014</a:t>
             </a:fld>
             <a:endParaRPr lang="en-US"/>
           </a:p>
@@ -5927,7 +5927,7 @@
           <a:p>
             <a:fld id="{699DC775-C286-4358-8C92-D7E584E969B3}" type="datetimeFigureOut">
               <a:rPr lang="en-US" smtClean="0"/>
-              <a:t>3/26/2014</a:t>
+              <a:t>5/25/2014</a:t>
             </a:fld>
             <a:endParaRPr lang="en-US"/>
           </a:p>
@@ -6115,7 +6115,7 @@
           <a:p>
             <a:fld id="{699DC775-C286-4358-8C92-D7E584E969B3}" type="datetimeFigureOut">
               <a:rPr lang="en-US" smtClean="0"/>
-              <a:t>3/26/2014</a:t>
+              <a:t>5/25/2014</a:t>
             </a:fld>
             <a:endParaRPr lang="en-US"/>
           </a:p>
@@ -6403,7 +6403,7 @@
           <a:p>
             <a:fld id="{699DC775-C286-4358-8C92-D7E584E969B3}" type="datetimeFigureOut">
               <a:rPr lang="en-US" smtClean="0"/>
-              <a:t>3/26/2014</a:t>
+              <a:t>5/25/2014</a:t>
             </a:fld>
             <a:endParaRPr lang="en-US"/>
           </a:p>
@@ -6825,7 +6825,7 @@
           <a:p>
             <a:fld id="{699DC775-C286-4358-8C92-D7E584E969B3}" type="datetimeFigureOut">
               <a:rPr lang="en-US" smtClean="0"/>
-              <a:t>3/26/2014</a:t>
+              <a:t>5/25/2014</a:t>
             </a:fld>
             <a:endParaRPr lang="en-US"/>
           </a:p>
@@ -6943,7 +6943,7 @@
           <a:p>
             <a:fld id="{699DC775-C286-4358-8C92-D7E584E969B3}" type="datetimeFigureOut">
               <a:rPr lang="en-US" smtClean="0"/>
-              <a:t>3/26/2014</a:t>
+              <a:t>5/25/2014</a:t>
             </a:fld>
             <a:endParaRPr lang="en-US"/>
           </a:p>
@@ -7038,7 +7038,7 @@
           <a:p>
             <a:fld id="{699DC775-C286-4358-8C92-D7E584E969B3}" type="datetimeFigureOut">
               <a:rPr lang="en-US" smtClean="0"/>
-              <a:t>3/26/2014</a:t>
+              <a:t>5/25/2014</a:t>
             </a:fld>
             <a:endParaRPr lang="en-US"/>
           </a:p>
@@ -7315,7 +7315,7 @@
           <a:p>
             <a:fld id="{699DC775-C286-4358-8C92-D7E584E969B3}" type="datetimeFigureOut">
               <a:rPr lang="en-US" smtClean="0"/>
-              <a:t>3/26/2014</a:t>
+              <a:t>5/25/2014</a:t>
             </a:fld>
             <a:endParaRPr lang="en-US"/>
           </a:p>
@@ -7568,7 +7568,7 @@
           <a:p>
             <a:fld id="{699DC775-C286-4358-8C92-D7E584E969B3}" type="datetimeFigureOut">
               <a:rPr lang="en-US" smtClean="0"/>
-              <a:t>3/26/2014</a:t>
+              <a:t>5/25/2014</a:t>
             </a:fld>
             <a:endParaRPr lang="en-US"/>
           </a:p>
@@ -7781,7 +7781,7 @@
           <a:p>
             <a:fld id="{699DC775-C286-4358-8C92-D7E584E969B3}" type="datetimeFigureOut">
               <a:rPr lang="en-US" smtClean="0"/>
-              <a:t>3/26/2014</a:t>
+              <a:t>5/25/2014</a:t>
             </a:fld>
             <a:endParaRPr lang="en-US"/>
           </a:p>
@@ -8296,7 +8296,7 @@
           <a:p>
             <a:fld id="{699DC775-C286-4358-8C92-D7E584E969B3}" type="datetimeFigureOut">
               <a:rPr lang="en-US" smtClean="0"/>
-              <a:t>3/26/2014</a:t>
+              <a:t>5/25/2014</a:t>
             </a:fld>
             <a:endParaRPr lang="en-US"/>
           </a:p>
@@ -8809,7 +8809,7 @@
           <a:p>
             <a:fld id="{699DC775-C286-4358-8C92-D7E584E969B3}" type="datetimeFigureOut">
               <a:rPr lang="en-US" smtClean="0"/>
-              <a:t>3/26/2014</a:t>
+              <a:t>5/25/2014</a:t>
             </a:fld>
             <a:endParaRPr lang="en-US"/>
           </a:p>
@@ -9219,17 +9219,7 @@
                   </a:schemeClr>
                 </a:solidFill>
               </a:rPr>
-              <a:t> </a:t>
-            </a:r>
-            <a:r>
-              <a:rPr lang="en-US" sz="5400" b="1" dirty="0" smtClean="0">
-                <a:solidFill>
-                  <a:schemeClr val="accent6">
-                    <a:lumMod val="75000"/>
-                  </a:schemeClr>
-                </a:solidFill>
-              </a:rPr>
-              <a:t>Test Cases</a:t>
+              <a:t> Test Cases</a:t>
             </a:r>
             <a:endParaRPr lang="en-SG" sz="5400" b="1" dirty="0">
               <a:solidFill>
@@ -9292,15 +9282,7 @@
                   <a:srgbClr val="0070C0"/>
                 </a:solidFill>
               </a:rPr>
-              <a:t>these </a:t>
-            </a:r>
-            <a:r>
-              <a:rPr lang="en-US" dirty="0" smtClean="0">
-                <a:solidFill>
-                  <a:srgbClr val="0070C0"/>
-                </a:solidFill>
-              </a:rPr>
-              <a:t>slides after testing. Keep this file in its original form.</a:t>
+              <a:t>these slides after testing. Keep this file in its original form.</a:t>
             </a:r>
             <a:endParaRPr lang="en-US" dirty="0">
               <a:solidFill>
@@ -9384,7 +9366,7 @@
 
 <file path=ppt/slides/slide10.xml><?xml version="1.0" encoding="utf-8"?>
 <p:sld xmlns:a="http://schemas.openxmlformats.org/drawingml/2006/main" xmlns:r="http://schemas.openxmlformats.org/officeDocument/2006/relationships" xmlns:p="http://schemas.openxmlformats.org/presentationml/2006/main">
-  <p:cSld name="PPTLabsSpotlight201403241427586738">
+  <p:cSld name="PPTLabsSpotlight201405252146148501">
     <p:spTree>
       <p:nvGrpSpPr>
         <p:cNvPr id="1" name=""/>
@@ -9563,416 +9545,106 @@
           </a:p>
         </p:txBody>
       </p:sp>
-      <p:sp>
-        <p:nvSpPr>
-          <p:cNvPr id="18" name="SpotlightShape717211eb-84e1-4fdf-9830-fc3fe6c6b3cf" hidden="1"/>
-          <p:cNvSpPr/>
+      <p:pic>
+        <p:nvPicPr>
+          <p:cNvPr id="19" name="SpotlightShape35982e27-9007-41b4-9c93-b50b11965c21" hidden="1"/>
+          <p:cNvPicPr>
+            <a:picLocks noChangeAspect="1"/>
+          </p:cNvPicPr>
           <p:nvPr/>
-        </p:nvSpPr>
+        </p:nvPicPr>
+        <p:blipFill>
+          <a:blip r:embed="rId3"/>
+          <a:stretch>
+            <a:fillRect/>
+          </a:stretch>
+        </p:blipFill>
         <p:spPr>
           <a:xfrm>
-            <a:off x="444500" y="381000"/>
-            <a:ext cx="2222500" cy="876300"/>
+            <a:off x="443134" y="383248"/>
+            <a:ext cx="2225233" cy="871804"/>
           </a:xfrm>
           <a:prstGeom prst="rect">
             <a:avLst/>
           </a:prstGeom>
-          <a:solidFill>
-            <a:srgbClr val="FFFFFF"/>
-          </a:solidFill>
-          <a:ln w="25400" cap="flat" cmpd="sng" algn="ctr">
-            <a:noFill/>
-            <a:prstDash val="solid"/>
-          </a:ln>
-          <a:effectLst/>
-          <a:extLst>
-            <a:ext uri="{91240B29-F687-4F45-9708-019B960494DF}">
-              <a14:hiddenLine xmlns:a14="http://schemas.microsoft.com/office/drawing/2010/main" w="25400" cap="flat" cmpd="sng" algn="ctr">
-                <a:solidFill>
-                  <a:schemeClr val="dk1"/>
-                </a:solidFill>
-                <a:prstDash val="solid"/>
-              </a14:hiddenLine>
-            </a:ext>
-          </a:extLst>
         </p:spPr>
-        <p:style>
-          <a:lnRef idx="2">
-            <a:schemeClr val="dk1"/>
-          </a:lnRef>
-          <a:fillRef idx="1">
-            <a:schemeClr val="lt1"/>
-          </a:fillRef>
-          <a:effectRef idx="0">
-            <a:schemeClr val="dk1"/>
-          </a:effectRef>
-          <a:fontRef idx="minor">
-            <a:schemeClr val="dk1"/>
-          </a:fontRef>
-        </p:style>
-        <p:txBody>
-          <a:bodyPr rtlCol="0" anchor="ctr"/>
-          <a:lstStyle/>
-          <a:p>
-            <a:pPr algn="ctr"/>
-            <a:r>
-              <a:rPr lang="en-US" dirty="0" smtClean="0">
-                <a:solidFill>
-                  <a:srgbClr val="FFFFFF"/>
-                </a:solidFill>
-              </a:rPr>
-              <a:t>Overlapping shapes</a:t>
-            </a:r>
-            <a:endParaRPr lang="en-SG" dirty="0">
-              <a:solidFill>
-                <a:srgbClr val="FFFFFF"/>
-              </a:solidFill>
-            </a:endParaRPr>
-          </a:p>
-        </p:txBody>
-      </p:sp>
-      <p:sp>
-        <p:nvSpPr>
-          <p:cNvPr id="20" name="SpotlightShapef5c8c7df-96ab-4153-b907-6352ed335b79" hidden="1"/>
-          <p:cNvSpPr/>
+      </p:pic>
+      <p:pic>
+        <p:nvPicPr>
+          <p:cNvPr id="20" name="SpotlightShape746daac2-68dd-4d35-96a6-4f4515af2b01" hidden="1"/>
+          <p:cNvPicPr>
+            <a:picLocks noChangeAspect="1"/>
+          </p:cNvPicPr>
           <p:nvPr/>
-        </p:nvSpPr>
+        </p:nvPicPr>
+        <p:blipFill>
+          <a:blip r:embed="rId4"/>
+          <a:stretch>
+            <a:fillRect/>
+          </a:stretch>
+        </p:blipFill>
         <p:spPr>
           <a:xfrm>
-            <a:off x="1143000" y="972127"/>
-            <a:ext cx="1981200" cy="1181501"/>
+            <a:off x="1142914" y="977611"/>
+            <a:ext cx="1981372" cy="1170533"/>
           </a:xfrm>
-          <a:prstGeom prst="flowChartDocument">
+          <a:prstGeom prst="rect">
             <a:avLst/>
           </a:prstGeom>
-          <a:solidFill>
-            <a:srgbClr val="FFFFFF"/>
-          </a:solidFill>
-          <a:ln w="25400" cap="flat" cmpd="sng" algn="ctr">
-            <a:noFill/>
-            <a:prstDash val="solid"/>
-          </a:ln>
-          <a:effectLst/>
-          <a:extLst>
-            <a:ext uri="{91240B29-F687-4F45-9708-019B960494DF}">
-              <a14:hiddenLine xmlns:a14="http://schemas.microsoft.com/office/drawing/2010/main" w="25400" cap="flat" cmpd="sng" algn="ctr">
-                <a:solidFill>
-                  <a:schemeClr val="dk1"/>
-                </a:solidFill>
-                <a:prstDash val="solid"/>
-              </a14:hiddenLine>
-            </a:ext>
-          </a:extLst>
         </p:spPr>
-        <p:style>
-          <a:lnRef idx="2">
-            <a:schemeClr val="dk1"/>
-          </a:lnRef>
-          <a:fillRef idx="1">
-            <a:schemeClr val="lt1"/>
-          </a:fillRef>
-          <a:effectRef idx="0">
-            <a:schemeClr val="dk1"/>
-          </a:effectRef>
-          <a:fontRef idx="minor">
-            <a:schemeClr val="dk1"/>
-          </a:fontRef>
-        </p:style>
-        <p:txBody>
-          <a:bodyPr rtlCol="0" anchor="ctr"/>
-          <a:lstStyle/>
-          <a:p>
-            <a:pPr algn="ctr"/>
-            <a:r>
-              <a:rPr lang="en-US" dirty="0" smtClean="0">
-                <a:solidFill>
-                  <a:srgbClr val="FFFFFF"/>
-                </a:solidFill>
-              </a:rPr>
-              <a:t>Overlapping shapes</a:t>
-            </a:r>
-            <a:endParaRPr lang="en-SG" dirty="0">
-              <a:solidFill>
-                <a:srgbClr val="FFFFFF"/>
-              </a:solidFill>
-            </a:endParaRPr>
-          </a:p>
-        </p:txBody>
-      </p:sp>
-      <p:sp>
-        <p:nvSpPr>
-          <p:cNvPr id="22" name="SpotlightShape241894bd-b585-47a7-97cc-bc07a0263fa8" hidden="1"/>
-          <p:cNvSpPr/>
+      </p:pic>
+      <p:pic>
+        <p:nvPicPr>
+          <p:cNvPr id="21" name="SpotlightShape7c05f63f-bffe-4fc2-a334-ced8abbc961a" hidden="1"/>
+          <p:cNvPicPr>
+            <a:picLocks noChangeAspect="1"/>
+          </p:cNvPicPr>
           <p:nvPr/>
-        </p:nvSpPr>
+        </p:nvPicPr>
+        <p:blipFill>
+          <a:blip r:embed="rId5"/>
+          <a:srcRect t="18691"/>
+          <a:stretch>
+            <a:fillRect/>
+          </a:stretch>
+        </p:blipFill>
         <p:spPr>
           <a:xfrm>
-            <a:off x="3589391" y="0"/>
-            <a:ext cx="1638391" cy="3057236"/>
+            <a:off x="3580567" y="0"/>
+            <a:ext cx="1639966" cy="3048562"/>
           </a:xfrm>
-          <a:custGeom>
+          <a:prstGeom prst="rect">
             <a:avLst/>
-            <a:gdLst>
-              <a:gd name="connsiteX0" fmla="*/ 3554 w 1638391"/>
-              <a:gd name="connsiteY0" fmla="*/ 1246909 h 3057236"/>
-              <a:gd name="connsiteX1" fmla="*/ 788645 w 1638391"/>
-              <a:gd name="connsiteY1" fmla="*/ 1265382 h 3057236"/>
-              <a:gd name="connsiteX2" fmla="*/ 807118 w 1638391"/>
-              <a:gd name="connsiteY2" fmla="*/ 3057236 h 3057236"/>
-              <a:gd name="connsiteX3" fmla="*/ 1638391 w 1638391"/>
-              <a:gd name="connsiteY3" fmla="*/ 3029527 h 3057236"/>
-              <a:gd name="connsiteX4" fmla="*/ 1638391 w 1638391"/>
-              <a:gd name="connsiteY4" fmla="*/ 0 h 3057236"/>
-              <a:gd name="connsiteX5" fmla="*/ 3554 w 1638391"/>
-              <a:gd name="connsiteY5" fmla="*/ 9236 h 3057236"/>
-              <a:gd name="connsiteX6" fmla="*/ 3554 w 1638391"/>
-              <a:gd name="connsiteY6" fmla="*/ 1246909 h 3057236"/>
-            </a:gdLst>
-            <a:ahLst/>
-            <a:cxnLst>
-              <a:cxn ang="0">
-                <a:pos x="connsiteX0" y="connsiteY0"/>
-              </a:cxn>
-              <a:cxn ang="0">
-                <a:pos x="connsiteX1" y="connsiteY1"/>
-              </a:cxn>
-              <a:cxn ang="0">
-                <a:pos x="connsiteX2" y="connsiteY2"/>
-              </a:cxn>
-              <a:cxn ang="0">
-                <a:pos x="connsiteX3" y="connsiteY3"/>
-              </a:cxn>
-              <a:cxn ang="0">
-                <a:pos x="connsiteX4" y="connsiteY4"/>
-              </a:cxn>
-              <a:cxn ang="0">
-                <a:pos x="connsiteX5" y="connsiteY5"/>
-              </a:cxn>
-              <a:cxn ang="0">
-                <a:pos x="connsiteX6" y="connsiteY6"/>
-              </a:cxn>
-            </a:cxnLst>
-            <a:rect l="l" t="t" r="r" b="b"/>
-            <a:pathLst>
-              <a:path w="1638391" h="3057236">
-                <a:moveTo>
-                  <a:pt x="3554" y="1246909"/>
-                </a:moveTo>
-                <a:lnTo>
-                  <a:pt x="788645" y="1265382"/>
-                </a:lnTo>
-                <a:lnTo>
-                  <a:pt x="807118" y="3057236"/>
-                </a:lnTo>
-                <a:lnTo>
-                  <a:pt x="1638391" y="3029527"/>
-                </a:lnTo>
-                <a:lnTo>
-                  <a:pt x="1638391" y="0"/>
-                </a:lnTo>
-                <a:lnTo>
-                  <a:pt x="3554" y="9236"/>
-                </a:lnTo>
-                <a:cubicBezTo>
-                  <a:pt x="475" y="424872"/>
-                  <a:pt x="-2603" y="840509"/>
-                  <a:pt x="3554" y="1246909"/>
-                </a:cubicBezTo>
-                <a:close/>
-              </a:path>
-            </a:pathLst>
-          </a:custGeom>
-          <a:solidFill>
-            <a:srgbClr val="FFFFFF"/>
-          </a:solidFill>
-          <a:ln w="25400" cap="flat" cmpd="sng" algn="ctr">
-            <a:noFill/>
-            <a:prstDash val="solid"/>
-          </a:ln>
-          <a:effectLst/>
-          <a:extLst>
-            <a:ext uri="{91240B29-F687-4F45-9708-019B960494DF}">
-              <a14:hiddenLine xmlns:a14="http://schemas.microsoft.com/office/drawing/2010/main" w="25400" cap="flat" cmpd="sng" algn="ctr">
-                <a:solidFill>
-                  <a:schemeClr val="dk1"/>
-                </a:solidFill>
-                <a:prstDash val="solid"/>
-              </a14:hiddenLine>
-            </a:ext>
-          </a:extLst>
+          </a:prstGeom>
         </p:spPr>
-        <p:style>
-          <a:lnRef idx="2">
-            <a:schemeClr val="dk1"/>
-          </a:lnRef>
-          <a:fillRef idx="1">
-            <a:schemeClr val="lt1"/>
-          </a:fillRef>
-          <a:effectRef idx="0">
-            <a:schemeClr val="dk1"/>
-          </a:effectRef>
-          <a:fontRef idx="minor">
-            <a:schemeClr val="dk1"/>
-          </a:fontRef>
-        </p:style>
-        <p:txBody>
-          <a:bodyPr rtlCol="0" anchor="ctr"/>
-          <a:lstStyle/>
-          <a:p>
-            <a:pPr algn="ctr"/>
-            <a:endParaRPr lang="en-SG"/>
-          </a:p>
-        </p:txBody>
-      </p:sp>
-      <p:sp>
-        <p:nvSpPr>
-          <p:cNvPr id="24" name="SpotlightShape3327bf20-9697-4486-84af-c1ada32b90a8" hidden="1"/>
-          <p:cNvSpPr/>
+      </p:pic>
+      <p:pic>
+        <p:nvPicPr>
+          <p:cNvPr id="23" name="SpotlightShapeb8f3bbe5-2557-4ee5-9f18-6b34f08c94ba" hidden="1"/>
+          <p:cNvPicPr>
+            <a:picLocks noChangeAspect="1"/>
+          </p:cNvPicPr>
           <p:nvPr/>
-        </p:nvSpPr>
+        </p:nvPicPr>
+        <p:blipFill>
+          <a:blip r:embed="rId6"/>
+          <a:stretch>
+            <a:fillRect/>
+          </a:stretch>
+        </p:blipFill>
         <p:spPr>
           <a:xfrm>
-            <a:off x="5562600" y="2000651"/>
-            <a:ext cx="2895600" cy="2418948"/>
+            <a:off x="5562474" y="1999964"/>
+            <a:ext cx="2895851" cy="2420322"/>
           </a:xfrm>
-          <a:custGeom>
+          <a:prstGeom prst="rect">
             <a:avLst/>
-            <a:gdLst>
-              <a:gd name="connsiteX0" fmla="*/ 86628 w 3214838"/>
-              <a:gd name="connsiteY0" fmla="*/ 9625 h 2849078"/>
-              <a:gd name="connsiteX1" fmla="*/ 3195588 w 3214838"/>
-              <a:gd name="connsiteY1" fmla="*/ 0 h 2849078"/>
-              <a:gd name="connsiteX2" fmla="*/ 3214838 w 3214838"/>
-              <a:gd name="connsiteY2" fmla="*/ 1443789 h 2849078"/>
-              <a:gd name="connsiteX3" fmla="*/ 1684421 w 3214838"/>
-              <a:gd name="connsiteY3" fmla="*/ 1491916 h 2849078"/>
-              <a:gd name="connsiteX4" fmla="*/ 1665171 w 3214838"/>
-              <a:gd name="connsiteY4" fmla="*/ 2849078 h 2849078"/>
-              <a:gd name="connsiteX5" fmla="*/ 0 w 3214838"/>
-              <a:gd name="connsiteY5" fmla="*/ 2829827 h 2849078"/>
-              <a:gd name="connsiteX6" fmla="*/ 86628 w 3214838"/>
-              <a:gd name="connsiteY6" fmla="*/ 9625 h 2849078"/>
-            </a:gdLst>
-            <a:ahLst/>
-            <a:cxnLst>
-              <a:cxn ang="0">
-                <a:pos x="connsiteX0" y="connsiteY0"/>
-              </a:cxn>
-              <a:cxn ang="0">
-                <a:pos x="connsiteX1" y="connsiteY1"/>
-              </a:cxn>
-              <a:cxn ang="0">
-                <a:pos x="connsiteX2" y="connsiteY2"/>
-              </a:cxn>
-              <a:cxn ang="0">
-                <a:pos x="connsiteX3" y="connsiteY3"/>
-              </a:cxn>
-              <a:cxn ang="0">
-                <a:pos x="connsiteX4" y="connsiteY4"/>
-              </a:cxn>
-              <a:cxn ang="0">
-                <a:pos x="connsiteX5" y="connsiteY5"/>
-              </a:cxn>
-              <a:cxn ang="0">
-                <a:pos x="connsiteX6" y="connsiteY6"/>
-              </a:cxn>
-            </a:cxnLst>
-            <a:rect l="l" t="t" r="r" b="b"/>
-            <a:pathLst>
-              <a:path w="3214838" h="2849078">
-                <a:moveTo>
-                  <a:pt x="86628" y="9625"/>
-                </a:moveTo>
-                <a:lnTo>
-                  <a:pt x="3195588" y="0"/>
-                </a:lnTo>
-                <a:lnTo>
-                  <a:pt x="3214838" y="1443789"/>
-                </a:lnTo>
-                <a:lnTo>
-                  <a:pt x="1684421" y="1491916"/>
-                </a:lnTo>
-                <a:lnTo>
-                  <a:pt x="1665171" y="2849078"/>
-                </a:lnTo>
-                <a:lnTo>
-                  <a:pt x="0" y="2829827"/>
-                </a:lnTo>
-                <a:lnTo>
-                  <a:pt x="86628" y="9625"/>
-                </a:lnTo>
-                <a:close/>
-              </a:path>
-            </a:pathLst>
-          </a:custGeom>
-          <a:solidFill>
-            <a:srgbClr val="FFFFFF"/>
-          </a:solidFill>
-          <a:ln w="25400" cap="flat" cmpd="sng" algn="ctr">
-            <a:noFill/>
-            <a:prstDash val="solid"/>
-          </a:ln>
-          <a:effectLst/>
-          <a:extLst>
-            <a:ext uri="{91240B29-F687-4F45-9708-019B960494DF}">
-              <a14:hiddenLine xmlns:a14="http://schemas.microsoft.com/office/drawing/2010/main" w="25400" cap="flat" cmpd="sng" algn="ctr">
-                <a:solidFill>
-                  <a:schemeClr val="dk1"/>
-                </a:solidFill>
-                <a:prstDash val="solid"/>
-              </a14:hiddenLine>
-            </a:ext>
-          </a:extLst>
+          </a:prstGeom>
         </p:spPr>
-        <p:style>
-          <a:lnRef idx="2">
-            <a:schemeClr val="dk1"/>
-          </a:lnRef>
-          <a:fillRef idx="1">
-            <a:schemeClr val="lt1"/>
-          </a:fillRef>
-          <a:effectRef idx="0">
-            <a:schemeClr val="dk1"/>
-          </a:effectRef>
-          <a:fontRef idx="minor">
-            <a:schemeClr val="dk1"/>
-          </a:fontRef>
-        </p:style>
-        <p:txBody>
-          <a:bodyPr rtlCol="0" anchor="ctr"/>
-          <a:lstStyle/>
-          <a:p>
-            <a:pPr algn="ctr"/>
-            <a:r>
-              <a:rPr lang="en-US" dirty="0" smtClean="0">
-                <a:solidFill>
-                  <a:srgbClr val="FFFFFF"/>
-                </a:solidFill>
-              </a:rPr>
-              <a:t>Custom shape</a:t>
-            </a:r>
-          </a:p>
-          <a:p>
-            <a:pPr algn="ctr"/>
-            <a:endParaRPr lang="en-US" dirty="0">
-              <a:solidFill>
-                <a:srgbClr val="FFFFFF"/>
-              </a:solidFill>
-            </a:endParaRPr>
-          </a:p>
-          <a:p>
-            <a:pPr algn="ctr"/>
-            <a:endParaRPr lang="en-SG" dirty="0">
-              <a:solidFill>
-                <a:srgbClr val="FFFFFF"/>
-              </a:solidFill>
-            </a:endParaRPr>
-          </a:p>
-        </p:txBody>
-      </p:sp>
-      <p:sp>
-        <p:nvSpPr>
-          <p:cNvPr id="26" name="SpotlightShape86b0de32-04cc-40c9-a8fa-9073ecf29785" hidden="1"/>
+      </p:pic>
+      <p:sp>
+        <p:nvSpPr>
+          <p:cNvPr id="25" name="SpotlightShape083d1c09-07c1-4185-837b-e944ca06e681" hidden="1"/>
           <p:cNvSpPr/>
           <p:nvPr/>
         </p:nvSpPr>
@@ -10038,355 +9710,119 @@
           </a:p>
         </p:txBody>
       </p:sp>
-      <p:sp>
-        <p:nvSpPr>
-          <p:cNvPr id="28" name="SpotlightShape83a686f5-07b7-4670-b80c-ef87c135692b" hidden="1"/>
-          <p:cNvSpPr/>
+      <p:pic>
+        <p:nvPicPr>
+          <p:cNvPr id="27" name="SpotlightShapee8273ff2-ea21-4fa0-b302-9a148907c262" hidden="1"/>
+          <p:cNvPicPr>
+            <a:picLocks noChangeAspect="1"/>
+          </p:cNvPicPr>
           <p:nvPr/>
-        </p:nvSpPr>
+        </p:nvPicPr>
+        <p:blipFill>
+          <a:blip r:embed="rId7"/>
+          <a:stretch>
+            <a:fillRect/>
+          </a:stretch>
+        </p:blipFill>
         <p:spPr>
           <a:xfrm>
-            <a:off x="4038600" y="4953000"/>
-            <a:ext cx="2209800" cy="685800"/>
-          </a:xfrm>
-          <a:prstGeom prst="flowChartAlternateProcess">
-            <a:avLst/>
-          </a:prstGeom>
-          <a:solidFill>
-            <a:srgbClr val="FFFFFF"/>
-          </a:solidFill>
-          <a:ln w="25400" cap="flat" cmpd="sng" algn="ctr">
-            <a:noFill/>
-            <a:prstDash val="solid"/>
-          </a:ln>
-          <a:effectLst/>
-          <a:extLst>
-            <a:ext uri="{91240B29-F687-4F45-9708-019B960494DF}">
-              <a14:hiddenLine xmlns:a14="http://schemas.microsoft.com/office/drawing/2010/main" w="25400" cap="flat" cmpd="sng" algn="ctr">
-                <a:solidFill>
-                  <a:schemeClr val="dk1"/>
-                </a:solidFill>
-                <a:prstDash val="solid"/>
-              </a14:hiddenLine>
-            </a:ext>
-          </a:extLst>
-        </p:spPr>
-        <p:style>
-          <a:lnRef idx="2">
-            <a:schemeClr val="dk1"/>
-          </a:lnRef>
-          <a:fillRef idx="1">
-            <a:schemeClr val="lt1"/>
-          </a:fillRef>
-          <a:effectRef idx="0">
-            <a:schemeClr val="dk1"/>
-          </a:effectRef>
-          <a:fontRef idx="minor">
-            <a:schemeClr val="dk1"/>
-          </a:fontRef>
-        </p:style>
-        <p:txBody>
-          <a:bodyPr rtlCol="0" anchor="ctr"/>
-          <a:lstStyle/>
-          <a:p>
-            <a:pPr algn="ctr"/>
-            <a:r>
-              <a:rPr lang="en-US" dirty="0" smtClean="0">
-                <a:solidFill>
-                  <a:srgbClr val="FFFFFF"/>
-                </a:solidFill>
-              </a:rPr>
-              <a:t>A duplicate of the shape behind this.</a:t>
-            </a:r>
-            <a:endParaRPr lang="en-SG" dirty="0">
-              <a:solidFill>
-                <a:srgbClr val="FFFFFF"/>
-              </a:solidFill>
-            </a:endParaRPr>
-          </a:p>
-        </p:txBody>
-      </p:sp>
-      <p:grpSp>
-        <p:nvGrpSpPr>
-          <p:cNvPr id="32" name="SpotlightShapeafd85a7f-4ee8-42dd-9e46-8dd3a4f3d3de" hidden="1"/>
-          <p:cNvGrpSpPr/>
-          <p:nvPr/>
-        </p:nvGrpSpPr>
-        <p:grpSpPr>
-          <a:xfrm>
-            <a:off x="514926" y="2534228"/>
-            <a:ext cx="1618674" cy="1504372"/>
-            <a:chOff x="514926" y="2534228"/>
-            <a:chExt cx="1618674" cy="1504372"/>
-          </a:xfrm>
-        </p:grpSpPr>
-        <p:sp>
-          <p:nvSpPr>
-            <p:cNvPr id="33" name="L-Shape 32" hidden="1"/>
-            <p:cNvSpPr/>
-            <p:nvPr/>
-          </p:nvSpPr>
-          <p:spPr>
-            <a:xfrm>
-              <a:off x="533400" y="3048000"/>
-              <a:ext cx="1600200" cy="990600"/>
-            </a:xfrm>
-            <a:prstGeom prst="corner">
-              <a:avLst/>
-            </a:prstGeom>
-            <a:solidFill>
-              <a:srgbClr val="FFFFFF"/>
-            </a:solidFill>
-            <a:ln w="25400" cap="flat" cmpd="sng" algn="ctr">
-              <a:noFill/>
-              <a:prstDash val="solid"/>
-            </a:ln>
-            <a:effectLst/>
-            <a:extLst>
-              <a:ext uri="{91240B29-F687-4F45-9708-019B960494DF}">
-                <a14:hiddenLine xmlns:a14="http://schemas.microsoft.com/office/drawing/2010/main" w="25400" cap="flat" cmpd="sng" algn="ctr">
-                  <a:solidFill>
-                    <a:schemeClr val="dk1"/>
-                  </a:solidFill>
-                  <a:prstDash val="solid"/>
-                </a14:hiddenLine>
-              </a:ext>
-            </a:extLst>
-          </p:spPr>
-          <p:style>
-            <a:lnRef idx="2">
-              <a:schemeClr val="dk1"/>
-            </a:lnRef>
-            <a:fillRef idx="1">
-              <a:schemeClr val="lt1"/>
-            </a:fillRef>
-            <a:effectRef idx="0">
-              <a:schemeClr val="dk1"/>
-            </a:effectRef>
-            <a:fontRef idx="minor">
-              <a:schemeClr val="dk1"/>
-            </a:fontRef>
-          </p:style>
-          <p:txBody>
-            <a:bodyPr rtlCol="0" anchor="ctr"/>
-            <a:lstStyle/>
-            <a:p>
-              <a:pPr algn="ctr"/>
-              <a:r>
-                <a:rPr lang="en-US" dirty="0" smtClean="0"/>
-                <a:t>Grouped</a:t>
-              </a:r>
-              <a:endParaRPr lang="en-SG" dirty="0"/>
-            </a:p>
-          </p:txBody>
-        </p:sp>
-        <p:sp>
-          <p:nvSpPr>
-            <p:cNvPr id="34" name="Flowchart: Connector 33" hidden="1"/>
-            <p:cNvSpPr/>
-            <p:nvPr/>
-          </p:nvSpPr>
-          <p:spPr>
-            <a:xfrm>
-              <a:off x="514926" y="2534228"/>
-              <a:ext cx="495300" cy="495300"/>
-            </a:xfrm>
-            <a:prstGeom prst="flowChartConnector">
-              <a:avLst/>
-            </a:prstGeom>
-            <a:solidFill>
-              <a:srgbClr val="FFFFFF"/>
-            </a:solidFill>
-            <a:ln w="25400" cap="flat" cmpd="sng" algn="ctr">
-              <a:noFill/>
-              <a:prstDash val="solid"/>
-            </a:ln>
-            <a:effectLst/>
-            <a:extLst>
-              <a:ext uri="{91240B29-F687-4F45-9708-019B960494DF}">
-                <a14:hiddenLine xmlns:a14="http://schemas.microsoft.com/office/drawing/2010/main" w="25400" cap="flat" cmpd="sng" algn="ctr">
-                  <a:solidFill>
-                    <a:schemeClr val="dk1"/>
-                  </a:solidFill>
-                  <a:prstDash val="solid"/>
-                </a14:hiddenLine>
-              </a:ext>
-            </a:extLst>
-          </p:spPr>
-          <p:style>
-            <a:lnRef idx="2">
-              <a:schemeClr val="dk1"/>
-            </a:lnRef>
-            <a:fillRef idx="1">
-              <a:schemeClr val="lt1"/>
-            </a:fillRef>
-            <a:effectRef idx="0">
-              <a:schemeClr val="dk1"/>
-            </a:effectRef>
-            <a:fontRef idx="minor">
-              <a:schemeClr val="dk1"/>
-            </a:fontRef>
-          </p:style>
-          <p:txBody>
-            <a:bodyPr rtlCol="0" anchor="ctr"/>
-            <a:lstStyle/>
-            <a:p>
-              <a:pPr algn="ctr"/>
-              <a:endParaRPr lang="en-SG"/>
-            </a:p>
-          </p:txBody>
-        </p:sp>
-      </p:grpSp>
-      <p:sp>
-        <p:nvSpPr>
-          <p:cNvPr id="36" name="SpotlightShape93948376-cec4-4f96-ae11-bb3cdddb836e" hidden="1"/>
-          <p:cNvSpPr/>
-          <p:nvPr/>
-        </p:nvSpPr>
-        <p:spPr>
-          <a:xfrm>
-            <a:off x="0" y="5943600"/>
-            <a:ext cx="9144000" cy="723899"/>
+            <a:off x="513424" y="2518252"/>
+            <a:ext cx="1621677" cy="1536325"/>
           </a:xfrm>
           <a:prstGeom prst="rect">
             <a:avLst/>
           </a:prstGeom>
-          <a:solidFill>
-            <a:srgbClr val="FFFFFF"/>
-          </a:solidFill>
-          <a:ln w="25400" cap="flat" cmpd="sng" algn="ctr">
-            <a:noFill/>
-            <a:prstDash val="solid"/>
-          </a:ln>
-          <a:effectLst/>
-          <a:extLst>
-            <a:ext uri="{91240B29-F687-4F45-9708-019B960494DF}">
-              <a14:hiddenLine xmlns:a14="http://schemas.microsoft.com/office/drawing/2010/main" w="25400" cap="flat" cmpd="sng" algn="ctr">
-                <a:solidFill>
-                  <a:schemeClr val="dk1"/>
-                </a:solidFill>
-                <a:prstDash val="solid"/>
-              </a14:hiddenLine>
-            </a:ext>
-          </a:extLst>
         </p:spPr>
-        <p:style>
-          <a:lnRef idx="2">
-            <a:schemeClr val="dk1"/>
-          </a:lnRef>
-          <a:fillRef idx="1">
-            <a:schemeClr val="lt1"/>
-          </a:fillRef>
-          <a:effectRef idx="0">
-            <a:schemeClr val="dk1"/>
-          </a:effectRef>
-          <a:fontRef idx="minor">
-            <a:schemeClr val="dk1"/>
-          </a:fontRef>
-        </p:style>
-        <p:txBody>
-          <a:bodyPr rtlCol="0" anchor="ctr"/>
-          <a:lstStyle/>
-          <a:p>
-            <a:pPr algn="ctr"/>
-            <a:r>
-              <a:rPr lang="en-US" dirty="0" smtClean="0">
-                <a:solidFill>
-                  <a:srgbClr val="FFFFFF"/>
-                </a:solidFill>
-              </a:rPr>
-              <a:t>Shape wider than slide</a:t>
-            </a:r>
-            <a:endParaRPr lang="en-SG" dirty="0">
-              <a:solidFill>
-                <a:srgbClr val="FFFFFF"/>
-              </a:solidFill>
-            </a:endParaRPr>
-          </a:p>
-        </p:txBody>
-      </p:sp>
+      </p:pic>
       <p:pic>
         <p:nvPicPr>
-          <p:cNvPr id="12290" name="SpotlightShape1"/>
+          <p:cNvPr id="29" name="SpotlightShape1186d95c-caee-43b2-87b9-52530a1f4760" hidden="1"/>
           <p:cNvPicPr>
-            <a:picLocks noChangeArrowheads="1"/>
+            <a:picLocks noChangeAspect="1"/>
           </p:cNvPicPr>
           <p:nvPr/>
         </p:nvPicPr>
         <p:blipFill>
-          <a:blip r:embed="rId3">
-            <a:clrChange>
-              <a:clrFrom>
-                <a:srgbClr val="FFFFFF"/>
-              </a:clrFrom>
-              <a:clrTo>
-                <a:srgbClr val="FFFFFF">
-                  <a:alpha val="0"/>
-                </a:srgbClr>
-              </a:clrTo>
-            </a:clrChange>
+          <a:blip r:embed="rId8"/>
+          <a:stretch>
+            <a:fillRect/>
+          </a:stretch>
+        </p:blipFill>
+        <p:spPr>
+          <a:xfrm>
+            <a:off x="4040029" y="4911818"/>
+            <a:ext cx="2206943" cy="768163"/>
+          </a:xfrm>
+          <a:prstGeom prst="rect">
+            <a:avLst/>
+          </a:prstGeom>
+        </p:spPr>
+      </p:pic>
+      <p:pic>
+        <p:nvPicPr>
+          <p:cNvPr id="31" name="SpotlightShapeb54b380c-d43b-4213-9652-17bed96ca9f2" hidden="1"/>
+          <p:cNvPicPr>
+            <a:picLocks noChangeAspect="1"/>
+          </p:cNvPicPr>
+          <p:nvPr/>
+        </p:nvPicPr>
+        <p:blipFill>
+          <a:blip r:embed="rId9"/>
+          <a:srcRect l="8613" r="8613"/>
+          <a:stretch>
+            <a:fillRect/>
+          </a:stretch>
+        </p:blipFill>
+        <p:spPr>
+          <a:xfrm>
+            <a:off x="0" y="5942806"/>
+            <a:ext cx="9143999" cy="725487"/>
+          </a:xfrm>
+          <a:prstGeom prst="rect">
+            <a:avLst/>
+          </a:prstGeom>
+        </p:spPr>
+      </p:pic>
+      <p:pic>
+        <p:nvPicPr>
+          <p:cNvPr id="34" name="SpotlightShape1_rendered"/>
+          <p:cNvPicPr>
+            <a:picLocks/>
+          </p:cNvPicPr>
+          <p:nvPr/>
+        </p:nvPicPr>
+        <p:blipFill>
+          <a:blip r:embed="rId10">
             <a:extLst>
               <a:ext uri="{28A0092B-C50C-407E-A947-70E740481C1C}">
                 <a14:useLocalDpi xmlns:a14="http://schemas.microsoft.com/office/drawing/2010/main" val="0"/>
               </a:ext>
             </a:extLst>
           </a:blip>
-          <a:srcRect/>
           <a:stretch>
             <a:fillRect/>
           </a:stretch>
         </p:blipFill>
-        <p:spPr bwMode="auto">
+        <p:spPr>
           <a:xfrm>
             <a:off x="-127000" y="-127000"/>
-            <a:ext cx="9401176" cy="7115176"/>
+            <a:ext cx="9400847" cy="7114649"/>
           </a:xfrm>
           <a:prstGeom prst="rect">
             <a:avLst/>
           </a:prstGeom>
-          <a:noFill/>
-          <a:ln>
-            <a:noFill/>
-          </a:ln>
-          <a:effectLst>
-            <a:outerShdw dist="35921" dir="2700000" algn="ctr" rotWithShape="0">
-              <a:schemeClr val="bg2"/>
-            </a:outerShdw>
-            <a:softEdge rad="127000"/>
-          </a:effectLst>
-          <a:extLst>
-            <a:ext uri="{909E8E84-426E-40DD-AFC4-6F175D3DCCD1}">
-              <a14:hiddenFill xmlns:a14="http://schemas.microsoft.com/office/drawing/2010/main">
-                <a:solidFill>
-                  <a:schemeClr val="accent1">
-                    <a:alpha val="0"/>
-                  </a:schemeClr>
-                </a:solidFill>
-              </a14:hiddenFill>
-            </a:ext>
-            <a:ext uri="{91240B29-F687-4F45-9708-019B960494DF}">
-              <a14:hiddenLine xmlns:a14="http://schemas.microsoft.com/office/drawing/2010/main" w="9525">
-                <a:solidFill>
-                  <a:schemeClr val="tx1"/>
-                </a:solidFill>
-                <a:miter lim="800000"/>
-                <a:headEnd/>
-                <a:tailEnd/>
-              </a14:hiddenLine>
-            </a:ext>
-          </a:extLst>
         </p:spPr>
       </p:pic>
       <p:pic>
         <p:nvPicPr>
-          <p:cNvPr id="11" name="PPIndicator201403241427587308"/>
+          <p:cNvPr id="30" name="PPIndicator201405252146150181"/>
           <p:cNvPicPr>
             <a:picLocks/>
           </p:cNvPicPr>
           <p:nvPr/>
         </p:nvPicPr>
         <p:blipFill>
-          <a:blip r:embed="rId4" cstate="print">
+          <a:blip r:embed="rId11" cstate="print">
             <a:extLst>
               <a:ext uri="{28A0092B-C50C-407E-A947-70E740481C1C}">
                 <a14:useLocalDpi xmlns:a14="http://schemas.microsoft.com/office/drawing/2010/main" val="0"/>
@@ -10409,7 +9845,7 @@
       </p:pic>
       <p:sp>
         <p:nvSpPr>
-          <p:cNvPr id="39" name="text 3"/>
+          <p:cNvPr id="36" name="[text 3]"/>
           <p:cNvSpPr txBox="1"/>
           <p:nvPr/>
         </p:nvSpPr>
@@ -10448,13 +9884,21 @@
     </p:spTree>
     <p:extLst>
       <p:ext uri="{BB962C8B-B14F-4D97-AF65-F5344CB8AC3E}">
-        <p14:creationId xmlns:p14="http://schemas.microsoft.com/office/powerpoint/2010/main" val="3468373266"/>
+        <p14:creationId xmlns:p14="http://schemas.microsoft.com/office/powerpoint/2010/main" val="248668751"/>
       </p:ext>
     </p:extLst>
   </p:cSld>
   <p:clrMapOvr>
     <a:masterClrMapping/>
   </p:clrMapOvr>
+  <mc:AlternateContent xmlns:mc="http://schemas.openxmlformats.org/markup-compatibility/2006">
+    <mc:Choice xmlns:p14="http://schemas.microsoft.com/office/powerpoint/2010/main" Requires="p14">
+      <p:transition spd="slow" p14:dur="2000"/>
+    </mc:Choice>
+    <mc:Fallback>
+      <p:transition spd="slow"/>
+    </mc:Fallback>
+  </mc:AlternateContent>
   <p:timing>
     <p:tnLst>
       <p:par>
@@ -10492,7 +9936,7 @@
                                           </p:stCondLst>
                                         </p:cTn>
                                         <p:tgtEl>
-                                          <p:spTgt spid="11"/>
+                                          <p:spTgt spid="30"/>
                                         </p:tgtEl>
                                         <p:attrNameLst>
                                           <p:attrName>style.visibility</p:attrName>
@@ -10519,7 +9963,7 @@
                                           </p:stCondLst>
                                         </p:cTn>
                                         <p:tgtEl>
-                                          <p:spTgt spid="11"/>
+                                          <p:spTgt spid="30"/>
                                         </p:tgtEl>
                                         <p:attrNameLst>
                                           <p:attrName>style.visibility</p:attrName>
@@ -11185,11 +10629,13 @@
               <a:alpha val="30000"/>
             </a:srgbClr>
           </a:solidFill>
-          <a:ln>
+          <a:ln w="25400" cap="flat" cmpd="sng" algn="ctr">
             <a:solidFill>
               <a:srgbClr val="000000"/>
             </a:solidFill>
+            <a:prstDash val="solid"/>
           </a:ln>
+          <a:effectLst/>
         </p:spPr>
         <p:style>
           <a:lnRef idx="2">
@@ -11216,7 +10662,7 @@
       </p:sp>
       <p:sp>
         <p:nvSpPr>
-          <p:cNvPr id="5" name="text 3"/>
+          <p:cNvPr id="5" name="[text 3]"/>
           <p:cNvSpPr txBox="1"/>
           <p:nvPr/>
         </p:nvSpPr>
@@ -11261,7 +10707,7 @@
     </p:spTree>
     <p:extLst>
       <p:ext uri="{BB962C8B-B14F-4D97-AF65-F5344CB8AC3E}">
-        <p14:creationId xmlns:p14="http://schemas.microsoft.com/office/powerpoint/2010/main" val="792672454"/>
+        <p14:creationId xmlns:p14="http://schemas.microsoft.com/office/powerpoint/2010/main" val="3454674246"/>
       </p:ext>
     </p:extLst>
   </p:cSld>
@@ -11382,7 +10828,7 @@
 
 <file path=ppt/slides/slide6.xml><?xml version="1.0" encoding="utf-8"?>
 <p:sld xmlns:a="http://schemas.openxmlformats.org/drawingml/2006/main" xmlns:r="http://schemas.openxmlformats.org/officeDocument/2006/relationships" xmlns:p="http://schemas.openxmlformats.org/presentationml/2006/main">
-  <p:cSld name="PPTLabsSpotlight201403241404400610">
+  <p:cSld>
     <p:spTree>
       <p:nvGrpSpPr>
         <p:cNvPr id="1" name=""/>
@@ -11438,144 +10884,70 @@
           </a:extLst>
         </p:spPr>
       </p:pic>
-      <p:sp>
-        <p:nvSpPr>
-          <p:cNvPr id="6" name="SpotlightShape8e6d8d4d-96b6-4b1a-81d7-e7069d9bd924" hidden="1"/>
-          <p:cNvSpPr/>
-          <p:nvPr/>
-        </p:nvSpPr>
-        <p:spPr>
-          <a:xfrm>
-            <a:off x="3886200" y="1752600"/>
-            <a:ext cx="1524000" cy="1524000"/>
-          </a:xfrm>
-          <a:prstGeom prst="flowChartConnector">
-            <a:avLst/>
-          </a:prstGeom>
-          <a:solidFill>
-            <a:srgbClr val="FFFFFF"/>
-          </a:solidFill>
-          <a:ln w="25400" cap="flat" cmpd="sng" algn="ctr">
-            <a:noFill/>
-            <a:prstDash val="solid"/>
-          </a:ln>
-          <a:effectLst/>
-          <a:extLst>
-            <a:ext uri="{91240B29-F687-4F45-9708-019B960494DF}">
-              <a14:hiddenLine xmlns:a14="http://schemas.microsoft.com/office/drawing/2010/main" w="25400" cap="flat" cmpd="sng" algn="ctr">
-                <a:solidFill>
-                  <a:schemeClr val="dk1"/>
-                </a:solidFill>
-                <a:prstDash val="solid"/>
-              </a14:hiddenLine>
-            </a:ext>
-          </a:extLst>
-        </p:spPr>
-        <p:style>
-          <a:lnRef idx="2">
-            <a:schemeClr val="dk1"/>
-          </a:lnRef>
-          <a:fillRef idx="1">
-            <a:schemeClr val="lt1"/>
-          </a:fillRef>
-          <a:effectRef idx="0">
-            <a:schemeClr val="dk1"/>
-          </a:effectRef>
-          <a:fontRef idx="minor">
-            <a:schemeClr val="dk1"/>
-          </a:fontRef>
-        </p:style>
-        <p:txBody>
-          <a:bodyPr rtlCol="0" anchor="ctr"/>
-          <a:lstStyle/>
-          <a:p>
-            <a:pPr algn="ctr"/>
-            <a:endParaRPr lang="en-SG"/>
-          </a:p>
-        </p:txBody>
-      </p:sp>
       <p:pic>
         <p:nvPicPr>
-          <p:cNvPr id="3074" name="SpotlightShape1"/>
+          <p:cNvPr id="5" name="SpotlightShape284f107c-641c-4135-8b5e-1c51f8118e9f" hidden="1"/>
           <p:cNvPicPr>
-            <a:picLocks noChangeArrowheads="1"/>
+            <a:picLocks noChangeAspect="1"/>
           </p:cNvPicPr>
           <p:nvPr/>
         </p:nvPicPr>
         <p:blipFill>
-          <a:blip r:embed="rId3">
-            <a:clrChange>
-              <a:clrFrom>
-                <a:srgbClr val="FFFFFF"/>
-              </a:clrFrom>
-              <a:clrTo>
-                <a:srgbClr val="FFFFFF">
-                  <a:alpha val="0"/>
-                </a:srgbClr>
-              </a:clrTo>
-            </a:clrChange>
+          <a:blip r:embed="rId3"/>
+          <a:stretch>
+            <a:fillRect/>
+          </a:stretch>
+        </p:blipFill>
+        <p:spPr>
+          <a:xfrm>
+            <a:off x="3886134" y="1752534"/>
+            <a:ext cx="1524132" cy="1524132"/>
+          </a:xfrm>
+          <a:prstGeom prst="rect">
+            <a:avLst/>
+          </a:prstGeom>
+        </p:spPr>
+      </p:pic>
+      <p:pic>
+        <p:nvPicPr>
+          <p:cNvPr id="8" name="SpotlightShape1_rendered"/>
+          <p:cNvPicPr>
+            <a:picLocks/>
+          </p:cNvPicPr>
+          <p:nvPr/>
+        </p:nvPicPr>
+        <p:blipFill>
+          <a:blip r:embed="rId4">
             <a:extLst>
               <a:ext uri="{28A0092B-C50C-407E-A947-70E740481C1C}">
                 <a14:useLocalDpi xmlns:a14="http://schemas.microsoft.com/office/drawing/2010/main" val="0"/>
               </a:ext>
             </a:extLst>
           </a:blip>
-          <a:srcRect/>
           <a:stretch>
             <a:fillRect/>
           </a:stretch>
         </p:blipFill>
-        <p:spPr bwMode="auto">
+        <p:spPr>
           <a:xfrm>
             <a:off x="-127000" y="-127000"/>
-            <a:ext cx="9401176" cy="7115176"/>
+            <a:ext cx="9400847" cy="7114649"/>
           </a:xfrm>
           <a:prstGeom prst="rect">
             <a:avLst/>
           </a:prstGeom>
-          <a:noFill/>
-          <a:ln>
-            <a:noFill/>
-          </a:ln>
-          <a:effectLst>
-            <a:outerShdw dist="35921" dir="2700000" algn="ctr" rotWithShape="0">
-              <a:schemeClr val="bg2"/>
-            </a:outerShdw>
-            <a:softEdge rad="127000"/>
-          </a:effectLst>
-          <a:extLst>
-            <a:ext uri="{909E8E84-426E-40DD-AFC4-6F175D3DCCD1}">
-              <a14:hiddenFill xmlns:a14="http://schemas.microsoft.com/office/drawing/2010/main">
-                <a:solidFill>
-                  <a:schemeClr val="accent1">
-                    <a:alpha val="0"/>
-                  </a:schemeClr>
-                </a:solidFill>
-              </a14:hiddenFill>
-            </a:ext>
-            <a:ext uri="{91240B29-F687-4F45-9708-019B960494DF}">
-              <a14:hiddenLine xmlns:a14="http://schemas.microsoft.com/office/drawing/2010/main" w="9525">
-                <a:solidFill>
-                  <a:schemeClr val="tx1"/>
-                </a:solidFill>
-                <a:miter lim="800000"/>
-                <a:headEnd/>
-                <a:tailEnd/>
-              </a14:hiddenLine>
-            </a:ext>
-          </a:extLst>
         </p:spPr>
       </p:pic>
       <p:pic>
         <p:nvPicPr>
-          <p:cNvPr id="2" name="PPIndicator201403241404400780"/>
+          <p:cNvPr id="3" name="PPIndicator201405252145045131"/>
           <p:cNvPicPr>
             <a:picLocks/>
           </p:cNvPicPr>
           <p:nvPr/>
         </p:nvPicPr>
         <p:blipFill>
-          <a:blip r:embed="rId4" cstate="print">
+          <a:blip r:embed="rId5" cstate="print">
             <a:extLst>
               <a:ext uri="{28A0092B-C50C-407E-A947-70E740481C1C}">
                 <a14:useLocalDpi xmlns:a14="http://schemas.microsoft.com/office/drawing/2010/main" val="0"/>
@@ -11598,7 +10970,7 @@
       </p:pic>
       <p:sp>
         <p:nvSpPr>
-          <p:cNvPr id="10" name="text 3"/>
+          <p:cNvPr id="6" name="[text 3]"/>
           <p:cNvSpPr txBox="1"/>
           <p:nvPr/>
         </p:nvSpPr>
@@ -11643,13 +11015,21 @@
     </p:spTree>
     <p:extLst>
       <p:ext uri="{BB962C8B-B14F-4D97-AF65-F5344CB8AC3E}">
-        <p14:creationId xmlns:p14="http://schemas.microsoft.com/office/powerpoint/2010/main" val="45000137"/>
+        <p14:creationId xmlns:p14="http://schemas.microsoft.com/office/powerpoint/2010/main" val="1560320988"/>
       </p:ext>
     </p:extLst>
   </p:cSld>
   <p:clrMapOvr>
     <a:masterClrMapping/>
   </p:clrMapOvr>
+  <mc:AlternateContent xmlns:mc="http://schemas.openxmlformats.org/markup-compatibility/2006">
+    <mc:Choice xmlns:p14="http://schemas.microsoft.com/office/powerpoint/2010/main" Requires="p14">
+      <p:transition spd="slow" p14:dur="2000"/>
+    </mc:Choice>
+    <mc:Fallback>
+      <p:transition spd="slow"/>
+    </mc:Fallback>
+  </mc:AlternateContent>
   <p:timing>
     <p:tnLst>
       <p:par>
@@ -11687,7 +11067,7 @@
                                           </p:stCondLst>
                                         </p:cTn>
                                         <p:tgtEl>
-                                          <p:spTgt spid="2"/>
+                                          <p:spTgt spid="3"/>
                                         </p:tgtEl>
                                         <p:attrNameLst>
                                           <p:attrName>style.visibility</p:attrName>
@@ -11714,7 +11094,7 @@
                                           </p:stCondLst>
                                         </p:cTn>
                                         <p:tgtEl>
-                                          <p:spTgt spid="2"/>
+                                          <p:spTgt spid="3"/>
                                         </p:tgtEl>
                                         <p:attrNameLst>
                                           <p:attrName>style.visibility</p:attrName>
@@ -12779,11 +12159,13 @@
               <a:alpha val="30000"/>
             </a:srgbClr>
           </a:solidFill>
-          <a:ln>
+          <a:ln w="25400" cap="flat" cmpd="sng" algn="ctr">
             <a:solidFill>
               <a:srgbClr val="000000"/>
             </a:solidFill>
+            <a:prstDash val="solid"/>
           </a:ln>
+          <a:effectLst/>
         </p:spPr>
         <p:style>
           <a:lnRef idx="2">
@@ -12807,7 +12189,7 @@
             <a:r>
               <a:rPr lang="en-US" dirty="0" smtClean="0">
                 <a:solidFill>
-                  <a:prstClr val="white"/>
+                  <a:srgbClr val="FFFFFF"/>
                 </a:solidFill>
               </a:rPr>
               <a:t>Custom shape</a:t>
@@ -12817,7 +12199,7 @@
             <a:pPr algn="ctr"/>
             <a:endParaRPr lang="en-US" dirty="0">
               <a:solidFill>
-                <a:prstClr val="white"/>
+                <a:srgbClr val="FFFFFF"/>
               </a:solidFill>
             </a:endParaRPr>
           </a:p>
@@ -12825,7 +12207,7 @@
             <a:pPr algn="ctr"/>
             <a:endParaRPr lang="en-SG" dirty="0">
               <a:solidFill>
-                <a:prstClr val="white"/>
+                <a:srgbClr val="FFFFFF"/>
               </a:solidFill>
             </a:endParaRPr>
           </a:p>
@@ -12880,11 +12262,13 @@
               <a:alpha val="30000"/>
             </a:srgbClr>
           </a:solidFill>
-          <a:ln>
+          <a:ln w="25400" cap="flat" cmpd="sng" algn="ctr">
             <a:solidFill>
               <a:srgbClr val="000000"/>
             </a:solidFill>
+            <a:prstDash val="solid"/>
           </a:ln>
+          <a:effectLst/>
         </p:spPr>
         <p:style>
           <a:lnRef idx="2">
@@ -12908,14 +12292,14 @@
             <a:r>
               <a:rPr lang="en-US" dirty="0" smtClean="0">
                 <a:solidFill>
-                  <a:prstClr val="white"/>
+                  <a:srgbClr val="FFFFFF"/>
                 </a:solidFill>
               </a:rPr>
               <a:t>Shape wider than slide</a:t>
             </a:r>
             <a:endParaRPr lang="en-SG" dirty="0">
               <a:solidFill>
-                <a:prstClr val="white"/>
+                <a:srgbClr val="FFFFFF"/>
               </a:solidFill>
             </a:endParaRPr>
           </a:p>
@@ -12940,11 +12324,13 @@
               <a:alpha val="30000"/>
             </a:srgbClr>
           </a:solidFill>
-          <a:ln>
+          <a:ln w="25400" cap="flat" cmpd="sng" algn="ctr">
             <a:solidFill>
               <a:srgbClr val="000000"/>
             </a:solidFill>
+            <a:prstDash val="solid"/>
           </a:ln>
+          <a:effectLst/>
         </p:spPr>
         <p:style>
           <a:lnRef idx="2">
@@ -12966,10 +12352,18 @@
           <a:p>
             <a:pPr algn="ctr"/>
             <a:r>
-              <a:rPr lang="en-US" dirty="0" smtClean="0"/>
+              <a:rPr lang="en-US" dirty="0" smtClean="0">
+                <a:solidFill>
+                  <a:srgbClr val="FFFFFF"/>
+                </a:solidFill>
+              </a:rPr>
               <a:t>Overlapping shapes</a:t>
             </a:r>
-            <a:endParaRPr lang="en-SG" dirty="0"/>
+            <a:endParaRPr lang="en-SG" dirty="0">
+              <a:solidFill>
+                <a:srgbClr val="FFFFFF"/>
+              </a:solidFill>
+            </a:endParaRPr>
           </a:p>
         </p:txBody>
       </p:sp>
@@ -12992,11 +12386,13 @@
               <a:alpha val="30000"/>
             </a:srgbClr>
           </a:solidFill>
-          <a:ln>
+          <a:ln w="25400" cap="flat" cmpd="sng" algn="ctr">
             <a:solidFill>
               <a:srgbClr val="000000"/>
             </a:solidFill>
+            <a:prstDash val="solid"/>
           </a:ln>
+          <a:effectLst/>
         </p:spPr>
         <p:style>
           <a:lnRef idx="2">
@@ -13018,10 +12414,18 @@
           <a:p>
             <a:pPr algn="ctr"/>
             <a:r>
-              <a:rPr lang="en-US" dirty="0" smtClean="0"/>
+              <a:rPr lang="en-US" dirty="0" smtClean="0">
+                <a:solidFill>
+                  <a:srgbClr val="FFFFFF"/>
+                </a:solidFill>
+              </a:rPr>
               <a:t>Overlapping shapes</a:t>
             </a:r>
-            <a:endParaRPr lang="en-SG" dirty="0"/>
+            <a:endParaRPr lang="en-SG" dirty="0">
+              <a:solidFill>
+                <a:srgbClr val="FFFFFF"/>
+              </a:solidFill>
+            </a:endParaRPr>
           </a:p>
         </p:txBody>
       </p:sp>
@@ -13058,11 +12462,13 @@
                 <a:alpha val="30000"/>
               </a:srgbClr>
             </a:solidFill>
-            <a:ln>
+            <a:ln w="25400" cap="flat" cmpd="sng" algn="ctr">
               <a:solidFill>
                 <a:srgbClr val="000000"/>
               </a:solidFill>
+              <a:prstDash val="solid"/>
             </a:ln>
+            <a:effectLst/>
           </p:spPr>
           <p:style>
             <a:lnRef idx="2">
@@ -13084,10 +12490,18 @@
             <a:p>
               <a:pPr algn="ctr"/>
               <a:r>
-                <a:rPr lang="en-US" dirty="0" smtClean="0"/>
+                <a:rPr lang="en-US" dirty="0" smtClean="0">
+                  <a:solidFill>
+                    <a:srgbClr val="FFFFFF"/>
+                  </a:solidFill>
+                </a:rPr>
                 <a:t>Grouped</a:t>
               </a:r>
-              <a:endParaRPr lang="en-SG" dirty="0"/>
+              <a:endParaRPr lang="en-SG" dirty="0">
+                <a:solidFill>
+                  <a:srgbClr val="FFFFFF"/>
+                </a:solidFill>
+              </a:endParaRPr>
             </a:p>
           </p:txBody>
         </p:sp>
@@ -13110,11 +12524,13 @@
                 <a:alpha val="30000"/>
               </a:srgbClr>
             </a:solidFill>
-            <a:ln>
+            <a:ln w="25400" cap="flat" cmpd="sng" algn="ctr">
               <a:solidFill>
                 <a:srgbClr val="000000"/>
               </a:solidFill>
+              <a:prstDash val="solid"/>
             </a:ln>
+            <a:effectLst/>
           </p:spPr>
           <p:style>
             <a:lnRef idx="2">
@@ -13159,11 +12575,13 @@
               <a:alpha val="30000"/>
             </a:srgbClr>
           </a:solidFill>
-          <a:ln>
+          <a:ln w="25400" cap="flat" cmpd="sng" algn="ctr">
             <a:solidFill>
               <a:srgbClr val="000000"/>
             </a:solidFill>
+            <a:prstDash val="solid"/>
           </a:ln>
+          <a:effectLst/>
         </p:spPr>
         <p:style>
           <a:lnRef idx="2">
@@ -13185,10 +12603,18 @@
           <a:p>
             <a:pPr algn="ctr"/>
             <a:r>
-              <a:rPr lang="en-US" dirty="0" smtClean="0"/>
+              <a:rPr lang="en-US" dirty="0" smtClean="0">
+                <a:solidFill>
+                  <a:srgbClr val="FFFFFF"/>
+                </a:solidFill>
+              </a:rPr>
               <a:t>Complex shape</a:t>
             </a:r>
-            <a:endParaRPr lang="en-SG" dirty="0"/>
+            <a:endParaRPr lang="en-SG" dirty="0">
+              <a:solidFill>
+                <a:srgbClr val="FFFFFF"/>
+              </a:solidFill>
+            </a:endParaRPr>
           </a:p>
         </p:txBody>
       </p:sp>
@@ -13297,11 +12723,13 @@
               <a:alpha val="30000"/>
             </a:srgbClr>
           </a:solidFill>
-          <a:ln>
+          <a:ln w="25400" cap="flat" cmpd="sng" algn="ctr">
             <a:solidFill>
               <a:srgbClr val="000000"/>
             </a:solidFill>
+            <a:prstDash val="solid"/>
           </a:ln>
+          <a:effectLst/>
         </p:spPr>
         <p:style>
           <a:lnRef idx="2">
@@ -13323,10 +12751,18 @@
           <a:p>
             <a:pPr algn="ctr"/>
             <a:r>
-              <a:rPr lang="en-US" dirty="0" smtClean="0"/>
+              <a:rPr lang="en-US" dirty="0" smtClean="0">
+                <a:solidFill>
+                  <a:srgbClr val="FFFFFF"/>
+                </a:solidFill>
+              </a:rPr>
               <a:t>A duplicate of the shape behind this.</a:t>
             </a:r>
-            <a:endParaRPr lang="en-SG" dirty="0"/>
+            <a:endParaRPr lang="en-SG" dirty="0">
+              <a:solidFill>
+                <a:srgbClr val="FFFFFF"/>
+              </a:solidFill>
+            </a:endParaRPr>
           </a:p>
         </p:txBody>
       </p:sp>
@@ -13416,11 +12852,13 @@
               <a:alpha val="30000"/>
             </a:srgbClr>
           </a:solidFill>
-          <a:ln>
+          <a:ln w="25400" cap="flat" cmpd="sng" algn="ctr">
             <a:solidFill>
               <a:srgbClr val="000000"/>
             </a:solidFill>
+            <a:prstDash val="solid"/>
           </a:ln>
+          <a:effectLst/>
         </p:spPr>
         <p:style>
           <a:lnRef idx="2">
@@ -13444,7 +12882,7 @@
             <a:r>
               <a:rPr lang="en-US" dirty="0" smtClean="0">
                 <a:solidFill>
-                  <a:prstClr val="white"/>
+                  <a:srgbClr val="FFFFFF"/>
                 </a:solidFill>
               </a:rPr>
               <a:t>Shape beyond edge</a:t>
@@ -13454,7 +12892,7 @@
             <a:pPr algn="ctr"/>
             <a:endParaRPr lang="en-US" dirty="0">
               <a:solidFill>
-                <a:prstClr val="white"/>
+                <a:srgbClr val="FFFFFF"/>
               </a:solidFill>
             </a:endParaRPr>
           </a:p>
@@ -13462,7 +12900,7 @@
             <a:pPr algn="ctr"/>
             <a:endParaRPr lang="en-SG" dirty="0">
               <a:solidFill>
-                <a:prstClr val="white"/>
+                <a:srgbClr val="FFFFFF"/>
               </a:solidFill>
             </a:endParaRPr>
           </a:p>
@@ -13470,7 +12908,7 @@
       </p:sp>
       <p:sp>
         <p:nvSpPr>
-          <p:cNvPr id="16" name="text 3"/>
+          <p:cNvPr id="16" name="[text 3]"/>
           <p:cNvSpPr txBox="1"/>
           <p:nvPr/>
         </p:nvSpPr>
@@ -13509,7 +12947,7 @@
     </p:spTree>
     <p:extLst>
       <p:ext uri="{BB962C8B-B14F-4D97-AF65-F5344CB8AC3E}">
-        <p14:creationId xmlns:p14="http://schemas.microsoft.com/office/powerpoint/2010/main" val="3691846223"/>
+        <p14:creationId xmlns:p14="http://schemas.microsoft.com/office/powerpoint/2010/main" val="2078819124"/>
       </p:ext>
     </p:extLst>
   </p:cSld>
@@ -13540,7 +12978,7 @@
                             </p:stCondLst>
                             <p:childTnLst>
                               <p:par>
-                                <p:cTn id="5" presetID="1" presetClass="entr" presetSubtype="0" fill="hold" nodeType="withEffect">
+                                <p:cTn id="5" presetID="1" presetClass="entr" presetSubtype="0" fill="hold" grpId="0" nodeType="withEffect">
                                   <p:stCondLst>
                                     <p:cond delay="0"/>
                                   </p:stCondLst>
@@ -13553,7 +12991,7 @@
                                           </p:stCondLst>
                                         </p:cTn>
                                         <p:tgtEl>
-                                          <p:spTgt spid="10"/>
+                                          <p:spTgt spid="5"/>
                                         </p:tgtEl>
                                         <p:attrNameLst>
                                           <p:attrName>style.visibility</p:attrName>
@@ -13567,7 +13005,7 @@
                                 </p:cTn>
                               </p:par>
                               <p:par>
-                                <p:cTn id="7" presetID="1" presetClass="exit" presetSubtype="0" fill="hold" nodeType="withEffect">
+                                <p:cTn id="7" presetID="1" presetClass="exit" presetSubtype="0" fill="hold" grpId="1" nodeType="withEffect">
                                   <p:stCondLst>
                                     <p:cond delay="0"/>
                                   </p:stCondLst>
@@ -13580,7 +13018,7 @@
                                           </p:stCondLst>
                                         </p:cTn>
                                         <p:tgtEl>
-                                          <p:spTgt spid="10"/>
+                                          <p:spTgt spid="5"/>
                                         </p:tgtEl>
                                         <p:attrNameLst>
                                           <p:attrName>style.visibility</p:attrName>
@@ -13607,7 +13045,7 @@
                                           </p:stCondLst>
                                         </p:cTn>
                                         <p:tgtEl>
-                                          <p:spTgt spid="5"/>
+                                          <p:spTgt spid="17"/>
                                         </p:tgtEl>
                                         <p:attrNameLst>
                                           <p:attrName>style.visibility</p:attrName>
@@ -13634,7 +13072,7 @@
                                           </p:stCondLst>
                                         </p:cTn>
                                         <p:tgtEl>
-                                          <p:spTgt spid="5"/>
+                                          <p:spTgt spid="17"/>
                                         </p:tgtEl>
                                         <p:attrNameLst>
                                           <p:attrName>style.visibility</p:attrName>
@@ -13648,7 +13086,7 @@
                                 </p:cTn>
                               </p:par>
                               <p:par>
-                                <p:cTn id="13" presetID="1" presetClass="entr" presetSubtype="0" fill="hold" grpId="0" nodeType="withEffect">
+                                <p:cTn id="13" presetID="1" presetClass="entr" presetSubtype="0" fill="hold" nodeType="withEffect">
                                   <p:stCondLst>
                                     <p:cond delay="0"/>
                                   </p:stCondLst>
@@ -13661,7 +13099,7 @@
                                           </p:stCondLst>
                                         </p:cTn>
                                         <p:tgtEl>
-                                          <p:spTgt spid="17"/>
+                                          <p:spTgt spid="10"/>
                                         </p:tgtEl>
                                         <p:attrNameLst>
                                           <p:attrName>style.visibility</p:attrName>
@@ -13675,7 +13113,7 @@
                                 </p:cTn>
                               </p:par>
                               <p:par>
-                                <p:cTn id="15" presetID="1" presetClass="exit" presetSubtype="0" fill="hold" grpId="1" nodeType="withEffect">
+                                <p:cTn id="15" presetID="1" presetClass="exit" presetSubtype="0" fill="hold" nodeType="withEffect">
                                   <p:stCondLst>
                                     <p:cond delay="0"/>
                                   </p:stCondLst>
@@ -13688,7 +13126,7 @@
                                           </p:stCondLst>
                                         </p:cTn>
                                         <p:tgtEl>
-                                          <p:spTgt spid="17"/>
+                                          <p:spTgt spid="10"/>
                                         </p:tgtEl>
                                         <p:attrNameLst>
                                           <p:attrName>style.visibility</p:attrName>

</xml_diff>

<commit_message>
add Spotlight FT case
</commit_message>
<xml_diff>
--- a/doc/test/Spotlight.pptx
+++ b/doc/test/Spotlight.pptx
@@ -15,8 +15,8 @@
     <p:sldId id="302" r:id="rId9"/>
     <p:sldId id="293" r:id="rId10"/>
     <p:sldId id="294" r:id="rId11"/>
-    <p:sldId id="303" r:id="rId12"/>
-    <p:sldId id="304" r:id="rId13"/>
+    <p:sldId id="305" r:id="rId12"/>
+    <p:sldId id="306" r:id="rId13"/>
     <p:sldId id="274" r:id="rId14"/>
   </p:sldIdLst>
   <p:sldSz cx="9144000" cy="6858000" type="screen4x3"/>
@@ -133,8 +133,8 @@
             <p14:sldId id="302"/>
             <p14:sldId id="293"/>
             <p14:sldId id="294"/>
-            <p14:sldId id="303"/>
-            <p14:sldId id="304"/>
+            <p14:sldId id="305"/>
+            <p14:sldId id="306"/>
             <p14:sldId id="274"/>
           </p14:sldIdLst>
         </p14:section>
@@ -339,7 +339,7 @@
           <a:p>
             <a:fld id="{699DC775-C286-4358-8C92-D7E584E969B3}" type="datetimeFigureOut">
               <a:rPr lang="en-US" smtClean="0"/>
-              <a:t>5/25/2014</a:t>
+              <a:t>6/11/2015</a:t>
             </a:fld>
             <a:endParaRPr lang="en-US"/>
           </a:p>
@@ -509,7 +509,7 @@
           <a:p>
             <a:fld id="{699DC775-C286-4358-8C92-D7E584E969B3}" type="datetimeFigureOut">
               <a:rPr lang="en-US" smtClean="0"/>
-              <a:t>5/25/2014</a:t>
+              <a:t>6/11/2015</a:t>
             </a:fld>
             <a:endParaRPr lang="en-US"/>
           </a:p>
@@ -689,7 +689,7 @@
           <a:p>
             <a:fld id="{699DC775-C286-4358-8C92-D7E584E969B3}" type="datetimeFigureOut">
               <a:rPr lang="en-US" smtClean="0"/>
-              <a:t>5/25/2014</a:t>
+              <a:t>6/11/2015</a:t>
             </a:fld>
             <a:endParaRPr lang="en-US"/>
           </a:p>
@@ -931,7 +931,7 @@
           <a:p>
             <a:fld id="{699DC775-C286-4358-8C92-D7E584E969B3}" type="datetimeFigureOut">
               <a:rPr lang="en-US" smtClean="0"/>
-              <a:t>5/25/2014</a:t>
+              <a:t>6/11/2015</a:t>
             </a:fld>
             <a:endParaRPr lang="en-US"/>
           </a:p>
@@ -1101,7 +1101,7 @@
           <a:p>
             <a:fld id="{699DC775-C286-4358-8C92-D7E584E969B3}" type="datetimeFigureOut">
               <a:rPr lang="en-US" smtClean="0"/>
-              <a:t>5/25/2014</a:t>
+              <a:t>6/11/2015</a:t>
             </a:fld>
             <a:endParaRPr lang="en-US"/>
           </a:p>
@@ -1347,7 +1347,7 @@
           <a:p>
             <a:fld id="{699DC775-C286-4358-8C92-D7E584E969B3}" type="datetimeFigureOut">
               <a:rPr lang="en-US" smtClean="0"/>
-              <a:t>5/25/2014</a:t>
+              <a:t>6/11/2015</a:t>
             </a:fld>
             <a:endParaRPr lang="en-US"/>
           </a:p>
@@ -1635,7 +1635,7 @@
           <a:p>
             <a:fld id="{699DC775-C286-4358-8C92-D7E584E969B3}" type="datetimeFigureOut">
               <a:rPr lang="en-US" smtClean="0"/>
-              <a:t>5/25/2014</a:t>
+              <a:t>6/11/2015</a:t>
             </a:fld>
             <a:endParaRPr lang="en-US"/>
           </a:p>
@@ -2057,7 +2057,7 @@
           <a:p>
             <a:fld id="{699DC775-C286-4358-8C92-D7E584E969B3}" type="datetimeFigureOut">
               <a:rPr lang="en-US" smtClean="0"/>
-              <a:t>5/25/2014</a:t>
+              <a:t>6/11/2015</a:t>
             </a:fld>
             <a:endParaRPr lang="en-US"/>
           </a:p>
@@ -2175,7 +2175,7 @@
           <a:p>
             <a:fld id="{699DC775-C286-4358-8C92-D7E584E969B3}" type="datetimeFigureOut">
               <a:rPr lang="en-US" smtClean="0"/>
-              <a:t>5/25/2014</a:t>
+              <a:t>6/11/2015</a:t>
             </a:fld>
             <a:endParaRPr lang="en-US"/>
           </a:p>
@@ -2270,7 +2270,7 @@
           <a:p>
             <a:fld id="{699DC775-C286-4358-8C92-D7E584E969B3}" type="datetimeFigureOut">
               <a:rPr lang="en-US" smtClean="0"/>
-              <a:t>5/25/2014</a:t>
+              <a:t>6/11/2015</a:t>
             </a:fld>
             <a:endParaRPr lang="en-US"/>
           </a:p>
@@ -2547,7 +2547,7 @@
           <a:p>
             <a:fld id="{699DC775-C286-4358-8C92-D7E584E969B3}" type="datetimeFigureOut">
               <a:rPr lang="en-US" smtClean="0"/>
-              <a:t>5/25/2014</a:t>
+              <a:t>6/11/2015</a:t>
             </a:fld>
             <a:endParaRPr lang="en-US"/>
           </a:p>
@@ -2717,7 +2717,7 @@
           <a:p>
             <a:fld id="{699DC775-C286-4358-8C92-D7E584E969B3}" type="datetimeFigureOut">
               <a:rPr lang="en-US" smtClean="0"/>
-              <a:t>5/25/2014</a:t>
+              <a:t>6/11/2015</a:t>
             </a:fld>
             <a:endParaRPr lang="en-US"/>
           </a:p>
@@ -2970,7 +2970,7 @@
           <a:p>
             <a:fld id="{699DC775-C286-4358-8C92-D7E584E969B3}" type="datetimeFigureOut">
               <a:rPr lang="en-US" smtClean="0"/>
-              <a:t>5/25/2014</a:t>
+              <a:t>6/11/2015</a:t>
             </a:fld>
             <a:endParaRPr lang="en-US"/>
           </a:p>
@@ -3140,7 +3140,7 @@
           <a:p>
             <a:fld id="{699DC775-C286-4358-8C92-D7E584E969B3}" type="datetimeFigureOut">
               <a:rPr lang="en-US" smtClean="0"/>
-              <a:t>5/25/2014</a:t>
+              <a:t>6/11/2015</a:t>
             </a:fld>
             <a:endParaRPr lang="en-US"/>
           </a:p>
@@ -3320,7 +3320,7 @@
           <a:p>
             <a:fld id="{699DC775-C286-4358-8C92-D7E584E969B3}" type="datetimeFigureOut">
               <a:rPr lang="en-US" smtClean="0"/>
-              <a:t>5/25/2014</a:t>
+              <a:t>6/11/2015</a:t>
             </a:fld>
             <a:endParaRPr lang="en-US"/>
           </a:p>
@@ -3570,7 +3570,7 @@
           <a:p>
             <a:fld id="{699DC775-C286-4358-8C92-D7E584E969B3}" type="datetimeFigureOut">
               <a:rPr lang="en-US" smtClean="0"/>
-              <a:t>5/25/2014</a:t>
+              <a:t>6/11/2015</a:t>
             </a:fld>
             <a:endParaRPr lang="en-US"/>
           </a:p>
@@ -3748,7 +3748,7 @@
           <a:p>
             <a:fld id="{699DC775-C286-4358-8C92-D7E584E969B3}" type="datetimeFigureOut">
               <a:rPr lang="en-US" smtClean="0"/>
-              <a:t>5/25/2014</a:t>
+              <a:t>6/11/2015</a:t>
             </a:fld>
             <a:endParaRPr lang="en-US"/>
           </a:p>
@@ -4002,7 +4002,7 @@
           <a:p>
             <a:fld id="{699DC775-C286-4358-8C92-D7E584E969B3}" type="datetimeFigureOut">
               <a:rPr lang="en-US" smtClean="0"/>
-              <a:t>5/25/2014</a:t>
+              <a:t>6/11/2015</a:t>
             </a:fld>
             <a:endParaRPr lang="en-US"/>
           </a:p>
@@ -4298,7 +4298,7 @@
           <a:p>
             <a:fld id="{699DC775-C286-4358-8C92-D7E584E969B3}" type="datetimeFigureOut">
               <a:rPr lang="en-US" smtClean="0"/>
-              <a:t>5/25/2014</a:t>
+              <a:t>6/11/2015</a:t>
             </a:fld>
             <a:endParaRPr lang="en-US"/>
           </a:p>
@@ -4728,7 +4728,7 @@
           <a:p>
             <a:fld id="{699DC775-C286-4358-8C92-D7E584E969B3}" type="datetimeFigureOut">
               <a:rPr lang="en-US" smtClean="0"/>
-              <a:t>5/25/2014</a:t>
+              <a:t>6/11/2015</a:t>
             </a:fld>
             <a:endParaRPr lang="en-US"/>
           </a:p>
@@ -4854,7 +4854,7 @@
           <a:p>
             <a:fld id="{699DC775-C286-4358-8C92-D7E584E969B3}" type="datetimeFigureOut">
               <a:rPr lang="en-US" smtClean="0"/>
-              <a:t>5/25/2014</a:t>
+              <a:t>6/11/2015</a:t>
             </a:fld>
             <a:endParaRPr lang="en-US"/>
           </a:p>
@@ -4957,7 +4957,7 @@
           <a:p>
             <a:fld id="{699DC775-C286-4358-8C92-D7E584E969B3}" type="datetimeFigureOut">
               <a:rPr lang="en-US" smtClean="0"/>
-              <a:t>5/25/2014</a:t>
+              <a:t>6/11/2015</a:t>
             </a:fld>
             <a:endParaRPr lang="en-US"/>
           </a:p>
@@ -5203,7 +5203,7 @@
           <a:p>
             <a:fld id="{699DC775-C286-4358-8C92-D7E584E969B3}" type="datetimeFigureOut">
               <a:rPr lang="en-US" smtClean="0"/>
-              <a:t>5/25/2014</a:t>
+              <a:t>6/11/2015</a:t>
             </a:fld>
             <a:endParaRPr lang="en-US"/>
           </a:p>
@@ -5488,7 +5488,7 @@
           <a:p>
             <a:fld id="{699DC775-C286-4358-8C92-D7E584E969B3}" type="datetimeFigureOut">
               <a:rPr lang="en-US" smtClean="0"/>
-              <a:t>5/25/2014</a:t>
+              <a:t>6/11/2015</a:t>
             </a:fld>
             <a:endParaRPr lang="en-US"/>
           </a:p>
@@ -5749,7 +5749,7 @@
           <a:p>
             <a:fld id="{699DC775-C286-4358-8C92-D7E584E969B3}" type="datetimeFigureOut">
               <a:rPr lang="en-US" smtClean="0"/>
-              <a:t>5/25/2014</a:t>
+              <a:t>6/11/2015</a:t>
             </a:fld>
             <a:endParaRPr lang="en-US"/>
           </a:p>
@@ -5927,7 +5927,7 @@
           <a:p>
             <a:fld id="{699DC775-C286-4358-8C92-D7E584E969B3}" type="datetimeFigureOut">
               <a:rPr lang="en-US" smtClean="0"/>
-              <a:t>5/25/2014</a:t>
+              <a:t>6/11/2015</a:t>
             </a:fld>
             <a:endParaRPr lang="en-US"/>
           </a:p>
@@ -6115,7 +6115,7 @@
           <a:p>
             <a:fld id="{699DC775-C286-4358-8C92-D7E584E969B3}" type="datetimeFigureOut">
               <a:rPr lang="en-US" smtClean="0"/>
-              <a:t>5/25/2014</a:t>
+              <a:t>6/11/2015</a:t>
             </a:fld>
             <a:endParaRPr lang="en-US"/>
           </a:p>
@@ -6403,7 +6403,7 @@
           <a:p>
             <a:fld id="{699DC775-C286-4358-8C92-D7E584E969B3}" type="datetimeFigureOut">
               <a:rPr lang="en-US" smtClean="0"/>
-              <a:t>5/25/2014</a:t>
+              <a:t>6/11/2015</a:t>
             </a:fld>
             <a:endParaRPr lang="en-US"/>
           </a:p>
@@ -6825,7 +6825,7 @@
           <a:p>
             <a:fld id="{699DC775-C286-4358-8C92-D7E584E969B3}" type="datetimeFigureOut">
               <a:rPr lang="en-US" smtClean="0"/>
-              <a:t>5/25/2014</a:t>
+              <a:t>6/11/2015</a:t>
             </a:fld>
             <a:endParaRPr lang="en-US"/>
           </a:p>
@@ -6943,7 +6943,7 @@
           <a:p>
             <a:fld id="{699DC775-C286-4358-8C92-D7E584E969B3}" type="datetimeFigureOut">
               <a:rPr lang="en-US" smtClean="0"/>
-              <a:t>5/25/2014</a:t>
+              <a:t>6/11/2015</a:t>
             </a:fld>
             <a:endParaRPr lang="en-US"/>
           </a:p>
@@ -7038,7 +7038,7 @@
           <a:p>
             <a:fld id="{699DC775-C286-4358-8C92-D7E584E969B3}" type="datetimeFigureOut">
               <a:rPr lang="en-US" smtClean="0"/>
-              <a:t>5/25/2014</a:t>
+              <a:t>6/11/2015</a:t>
             </a:fld>
             <a:endParaRPr lang="en-US"/>
           </a:p>
@@ -7315,7 +7315,7 @@
           <a:p>
             <a:fld id="{699DC775-C286-4358-8C92-D7E584E969B3}" type="datetimeFigureOut">
               <a:rPr lang="en-US" smtClean="0"/>
-              <a:t>5/25/2014</a:t>
+              <a:t>6/11/2015</a:t>
             </a:fld>
             <a:endParaRPr lang="en-US"/>
           </a:p>
@@ -7568,7 +7568,7 @@
           <a:p>
             <a:fld id="{699DC775-C286-4358-8C92-D7E584E969B3}" type="datetimeFigureOut">
               <a:rPr lang="en-US" smtClean="0"/>
-              <a:t>5/25/2014</a:t>
+              <a:t>6/11/2015</a:t>
             </a:fld>
             <a:endParaRPr lang="en-US"/>
           </a:p>
@@ -7781,7 +7781,7 @@
           <a:p>
             <a:fld id="{699DC775-C286-4358-8C92-D7E584E969B3}" type="datetimeFigureOut">
               <a:rPr lang="en-US" smtClean="0"/>
-              <a:t>5/25/2014</a:t>
+              <a:t>6/11/2015</a:t>
             </a:fld>
             <a:endParaRPr lang="en-US"/>
           </a:p>
@@ -8296,7 +8296,7 @@
           <a:p>
             <a:fld id="{699DC775-C286-4358-8C92-D7E584E969B3}" type="datetimeFigureOut">
               <a:rPr lang="en-US" smtClean="0"/>
-              <a:t>5/25/2014</a:t>
+              <a:t>6/11/2015</a:t>
             </a:fld>
             <a:endParaRPr lang="en-US"/>
           </a:p>
@@ -8809,7 +8809,7 @@
           <a:p>
             <a:fld id="{699DC775-C286-4358-8C92-D7E584E969B3}" type="datetimeFigureOut">
               <a:rPr lang="en-US" smtClean="0"/>
-              <a:t>5/25/2014</a:t>
+              <a:t>6/11/2015</a:t>
             </a:fld>
             <a:endParaRPr lang="en-US"/>
           </a:p>
@@ -9366,7 +9366,7 @@
 
 <file path=ppt/slides/slide10.xml><?xml version="1.0" encoding="utf-8"?>
 <p:sld xmlns:a="http://schemas.openxmlformats.org/drawingml/2006/main" xmlns:r="http://schemas.openxmlformats.org/officeDocument/2006/relationships" xmlns:p="http://schemas.openxmlformats.org/presentationml/2006/main">
-  <p:cSld name="PPTLabsSpotlight201405252146148501">
+  <p:cSld name="PPTLabsSpotlight201506112335560585">
     <p:spTree>
       <p:nvGrpSpPr>
         <p:cNvPr id="1" name=""/>
@@ -9547,7 +9547,7 @@
       </p:sp>
       <p:pic>
         <p:nvPicPr>
-          <p:cNvPr id="19" name="SpotlightShape35982e27-9007-41b4-9c93-b50b11965c21" hidden="1"/>
+          <p:cNvPr id="19" name="SpotlightShape12282b07-0b89-463f-8a05-49144f68d07e" hidden="1"/>
           <p:cNvPicPr>
             <a:picLocks noChangeAspect="1"/>
           </p:cNvPicPr>
@@ -9571,7 +9571,7 @@
       </p:pic>
       <p:pic>
         <p:nvPicPr>
-          <p:cNvPr id="20" name="SpotlightShape746daac2-68dd-4d35-96a6-4f4515af2b01" hidden="1"/>
+          <p:cNvPr id="20" name="SpotlightShape66a8708e-b66c-4493-9974-b90a0afd10cc" hidden="1"/>
           <p:cNvPicPr>
             <a:picLocks noChangeAspect="1"/>
           </p:cNvPicPr>
@@ -9595,7 +9595,7 @@
       </p:pic>
       <p:pic>
         <p:nvPicPr>
-          <p:cNvPr id="21" name="SpotlightShape7c05f63f-bffe-4fc2-a334-ced8abbc961a" hidden="1"/>
+          <p:cNvPr id="21" name="SpotlightShapefffe4cf1-18b4-41d3-b0cc-578ee057d4e6" hidden="1"/>
           <p:cNvPicPr>
             <a:picLocks noChangeAspect="1"/>
           </p:cNvPicPr>
@@ -9620,7 +9620,7 @@
       </p:pic>
       <p:pic>
         <p:nvPicPr>
-          <p:cNvPr id="23" name="SpotlightShapeb8f3bbe5-2557-4ee5-9f18-6b34f08c94ba" hidden="1"/>
+          <p:cNvPr id="23" name="SpotlightShapea2b5016c-f664-4580-8919-535ac37d655a" hidden="1"/>
           <p:cNvPicPr>
             <a:picLocks noChangeAspect="1"/>
           </p:cNvPicPr>
@@ -9644,7 +9644,7 @@
       </p:pic>
       <p:sp>
         <p:nvSpPr>
-          <p:cNvPr id="25" name="SpotlightShape083d1c09-07c1-4185-837b-e944ca06e681" hidden="1"/>
+          <p:cNvPr id="25" name="SpotlightShape952aa4ab-ff7e-4f95-9caf-98b6a21420ca" hidden="1"/>
           <p:cNvSpPr/>
           <p:nvPr/>
         </p:nvSpPr>
@@ -9712,7 +9712,7 @@
       </p:sp>
       <p:pic>
         <p:nvPicPr>
-          <p:cNvPr id="27" name="SpotlightShapee8273ff2-ea21-4fa0-b302-9a148907c262" hidden="1"/>
+          <p:cNvPr id="27" name="SpotlightShape689d3e4e-9f2d-4f4c-ac9a-9425435846c7" hidden="1"/>
           <p:cNvPicPr>
             <a:picLocks noChangeAspect="1"/>
           </p:cNvPicPr>
@@ -9736,7 +9736,7 @@
       </p:pic>
       <p:pic>
         <p:nvPicPr>
-          <p:cNvPr id="29" name="SpotlightShape1186d95c-caee-43b2-87b9-52530a1f4760" hidden="1"/>
+          <p:cNvPr id="29" name="SpotlightShape0faee3ba-15f5-4be7-b3bf-e64efadbe155" hidden="1"/>
           <p:cNvPicPr>
             <a:picLocks noChangeAspect="1"/>
           </p:cNvPicPr>
@@ -9760,7 +9760,7 @@
       </p:pic>
       <p:pic>
         <p:nvPicPr>
-          <p:cNvPr id="31" name="SpotlightShapeb54b380c-d43b-4213-9652-17bed96ca9f2" hidden="1"/>
+          <p:cNvPr id="31" name="SpotlightShape7ec2b512-9549-486f-b857-7ea83d68bdd4" hidden="1"/>
           <p:cNvPicPr>
             <a:picLocks noChangeAspect="1"/>
           </p:cNvPicPr>
@@ -9815,7 +9815,7 @@
       </p:pic>
       <p:pic>
         <p:nvPicPr>
-          <p:cNvPr id="30" name="PPIndicator201405252146150181"/>
+          <p:cNvPr id="30" name="PPIndicator201506112335562205"/>
           <p:cNvPicPr>
             <a:picLocks/>
           </p:cNvPicPr>
@@ -9845,7 +9845,7 @@
       </p:pic>
       <p:sp>
         <p:nvSpPr>
-          <p:cNvPr id="36" name="[text 3]"/>
+          <p:cNvPr id="36" name="text 3"/>
           <p:cNvSpPr txBox="1"/>
           <p:nvPr/>
         </p:nvSpPr>
@@ -9884,7 +9884,7 @@
     </p:spTree>
     <p:extLst>
       <p:ext uri="{BB962C8B-B14F-4D97-AF65-F5344CB8AC3E}">
-        <p14:creationId xmlns:p14="http://schemas.microsoft.com/office/powerpoint/2010/main" val="248668751"/>
+        <p14:creationId xmlns:p14="http://schemas.microsoft.com/office/powerpoint/2010/main" val="3587590788"/>
       </p:ext>
     </p:extLst>
   </p:cSld>
@@ -10431,6 +10431,13 @@
   <p:clrMapOvr>
     <a:masterClrMapping/>
   </p:clrMapOvr>
+  <p:timing>
+    <p:tnLst>
+      <p:par>
+        <p:cTn id="1" dur="indefinite" restart="never" nodeType="tmRoot"/>
+      </p:par>
+    </p:tnLst>
+  </p:timing>
 </p:sld>
 </file>
 
@@ -11022,11 +11029,11 @@
   <p:clrMapOvr>
     <a:masterClrMapping/>
   </p:clrMapOvr>
-  <mc:AlternateContent xmlns:mc="http://schemas.openxmlformats.org/markup-compatibility/2006">
-    <mc:Choice xmlns:p14="http://schemas.microsoft.com/office/powerpoint/2010/main" Requires="p14">
+  <mc:AlternateContent xmlns:mc="http://schemas.openxmlformats.org/markup-compatibility/2006" xmlns:p14="http://schemas.microsoft.com/office/powerpoint/2010/main">
+    <mc:Choice Requires="p14">
       <p:transition spd="slow" p14:dur="2000"/>
     </mc:Choice>
-    <mc:Fallback>
+    <mc:Fallback xmlns="">
       <p:transition spd="slow"/>
     </mc:Fallback>
   </mc:AlternateContent>
@@ -11217,6 +11224,13 @@
   <p:clrMapOvr>
     <a:masterClrMapping/>
   </p:clrMapOvr>
+  <p:timing>
+    <p:tnLst>
+      <p:par>
+        <p:cTn id="1" dur="indefinite" restart="never" nodeType="tmRoot"/>
+      </p:par>
+    </p:tnLst>
+  </p:timing>
 </p:sld>
 </file>
 
@@ -12908,7 +12922,7 @@
       </p:sp>
       <p:sp>
         <p:nvSpPr>
-          <p:cNvPr id="16" name="[text 3]"/>
+          <p:cNvPr id="16" name="text 3"/>
           <p:cNvSpPr txBox="1"/>
           <p:nvPr/>
         </p:nvSpPr>
@@ -12947,7 +12961,7 @@
     </p:spTree>
     <p:extLst>
       <p:ext uri="{BB962C8B-B14F-4D97-AF65-F5344CB8AC3E}">
-        <p14:creationId xmlns:p14="http://schemas.microsoft.com/office/powerpoint/2010/main" val="2078819124"/>
+        <p14:creationId xmlns:p14="http://schemas.microsoft.com/office/powerpoint/2010/main" val="4177031443"/>
       </p:ext>
     </p:extLst>
   </p:cSld>

</xml_diff>